<commit_message>
update evaluation and slides
</commit_message>
<xml_diff>
--- a/GASP_Gergely-Attila-Kiss.pptx
+++ b/GASP_Gergely-Attila-Kiss.pptx
@@ -5,7 +5,7 @@
     <p:sldMasterId id="2147483648" r:id="rId4"/>
   </p:sldMasterIdLst>
   <p:notesMasterIdLst>
-    <p:notesMasterId r:id="rId19"/>
+    <p:notesMasterId r:id="rId20"/>
   </p:notesMasterIdLst>
   <p:sldIdLst>
     <p:sldId id="256" r:id="rId5"/>
@@ -21,7 +21,8 @@
     <p:sldId id="309" r:id="rId15"/>
     <p:sldId id="311" r:id="rId16"/>
     <p:sldId id="312" r:id="rId17"/>
-    <p:sldId id="310" r:id="rId18"/>
+    <p:sldId id="314" r:id="rId18"/>
+    <p:sldId id="310" r:id="rId19"/>
   </p:sldIdLst>
   <p:sldSz cx="12192000" cy="6858000"/>
   <p:notesSz cx="6858000" cy="9144000"/>
@@ -210,7 +211,7 @@
           <a:p>
             <a:fld id="{BA7E31CA-E8B0-4674-B0EE-198DC710A8FA}" type="datetimeFigureOut">
               <a:rPr lang="hu-HU" smtClean="0"/>
-              <a:t>2023.05.25.</a:t>
+              <a:t>2023.05.30.</a:t>
             </a:fld>
             <a:endParaRPr lang="hu-HU"/>
           </a:p>
@@ -704,7 +705,7 @@
           <a:p>
             <a:fld id="{37212EF4-3C67-4A44-B776-E3B0EAE400F2}" type="datetime1">
               <a:rPr lang="hu-HU" smtClean="0"/>
-              <a:t>2023.05.25.</a:t>
+              <a:t>2023.05.30.</a:t>
             </a:fld>
             <a:endParaRPr lang="hu-HU"/>
           </a:p>
@@ -886,7 +887,7 @@
           <a:p>
             <a:fld id="{07D25B75-A4E4-49B5-8D88-0B32B5B23B28}" type="datetime1">
               <a:rPr lang="hu-HU" smtClean="0"/>
-              <a:t>2023.05.25.</a:t>
+              <a:t>2023.05.30.</a:t>
             </a:fld>
             <a:endParaRPr lang="hu-HU"/>
           </a:p>
@@ -1078,7 +1079,7 @@
           <a:p>
             <a:fld id="{19E28890-4830-4AAC-9779-52F9A03917DA}" type="datetime1">
               <a:rPr lang="hu-HU" smtClean="0"/>
-              <a:t>2023.05.25.</a:t>
+              <a:t>2023.05.30.</a:t>
             </a:fld>
             <a:endParaRPr lang="hu-HU"/>
           </a:p>
@@ -1260,7 +1261,7 @@
           <a:p>
             <a:fld id="{72724B01-37D9-487D-992A-9F1E6573304E}" type="datetime1">
               <a:rPr lang="hu-HU" smtClean="0"/>
-              <a:t>2023.05.25.</a:t>
+              <a:t>2023.05.30.</a:t>
             </a:fld>
             <a:endParaRPr lang="hu-HU"/>
           </a:p>
@@ -1519,7 +1520,7 @@
           <a:p>
             <a:fld id="{97C72D8D-B3C0-49FA-91B8-97B98E1DA79F}" type="datetime1">
               <a:rPr lang="hu-HU" smtClean="0"/>
-              <a:t>2023.05.25.</a:t>
+              <a:t>2023.05.30.</a:t>
             </a:fld>
             <a:endParaRPr lang="hu-HU"/>
           </a:p>
@@ -1762,7 +1763,7 @@
           <a:p>
             <a:fld id="{02F6EBB3-63C9-41DC-88C5-CCAAD0621F66}" type="datetime1">
               <a:rPr lang="hu-HU" smtClean="0"/>
-              <a:t>2023.05.25.</a:t>
+              <a:t>2023.05.30.</a:t>
             </a:fld>
             <a:endParaRPr lang="hu-HU"/>
           </a:p>
@@ -2140,7 +2141,7 @@
           <a:p>
             <a:fld id="{F12FB369-5EEC-4926-ACCD-B1D9BFF89D01}" type="datetime1">
               <a:rPr lang="hu-HU" smtClean="0"/>
-              <a:t>2023.05.25.</a:t>
+              <a:t>2023.05.30.</a:t>
             </a:fld>
             <a:endParaRPr lang="hu-HU"/>
           </a:p>
@@ -2271,7 +2272,7 @@
           <a:p>
             <a:fld id="{195B96B3-106F-4F54-87CA-E6DD2D3D60CD}" type="datetime1">
               <a:rPr lang="hu-HU" smtClean="0"/>
-              <a:t>2023.05.25.</a:t>
+              <a:t>2023.05.30.</a:t>
             </a:fld>
             <a:endParaRPr lang="hu-HU"/>
           </a:p>
@@ -2380,7 +2381,7 @@
           <a:p>
             <a:fld id="{48A18E0D-C935-48B8-8F24-4EF377896796}" type="datetime1">
               <a:rPr lang="hu-HU" smtClean="0"/>
-              <a:t>2023.05.25.</a:t>
+              <a:t>2023.05.30.</a:t>
             </a:fld>
             <a:endParaRPr lang="hu-HU"/>
           </a:p>
@@ -2669,7 +2670,7 @@
           <a:p>
             <a:fld id="{D518D791-B04B-4F68-B09A-41A2B7D37E06}" type="datetime1">
               <a:rPr lang="hu-HU" smtClean="0"/>
-              <a:t>2023.05.25.</a:t>
+              <a:t>2023.05.30.</a:t>
             </a:fld>
             <a:endParaRPr lang="hu-HU"/>
           </a:p>
@@ -2935,7 +2936,7 @@
           <a:p>
             <a:fld id="{378FA7CC-00C7-478E-9186-2EACB97136E9}" type="datetime1">
               <a:rPr lang="hu-HU" smtClean="0"/>
-              <a:t>2023.05.25.</a:t>
+              <a:t>2023.05.30.</a:t>
             </a:fld>
             <a:endParaRPr lang="hu-HU"/>
           </a:p>
@@ -3155,7 +3156,7 @@
           <a:p>
             <a:fld id="{ECD1B67F-EF5F-4105-86D3-4679951838A5}" type="datetime1">
               <a:rPr lang="hu-HU" smtClean="0"/>
-              <a:t>2023.05.25.</a:t>
+              <a:t>2023.05.30.</a:t>
             </a:fld>
             <a:endParaRPr lang="hu-HU"/>
           </a:p>
@@ -3683,7 +3684,7 @@
                 </a:solidFill>
                 <a:latin typeface="Myriad "/>
               </a:rPr>
-              <a:t>GASP, 14 </a:t>
+              <a:t>GASP, </a:t>
             </a:r>
             <a:r>
               <a:rPr lang="hu-HU" sz="2400" b="1" i="1" dirty="0" err="1">
@@ -3701,7 +3702,7 @@
                 </a:solidFill>
                 <a:latin typeface="Myriad "/>
               </a:rPr>
-              <a:t> 2023</a:t>
+              <a:t> 14, 2023</a:t>
             </a:r>
           </a:p>
         </p:txBody>
@@ -3882,7 +3883,7 @@
         </p:spPr>
         <p:txBody>
           <a:bodyPr vert="horz" lIns="91440" tIns="45720" rIns="91440" bIns="45720" rtlCol="0">
-            <a:normAutofit lnSpcReduction="10000"/>
+            <a:normAutofit fontScale="92500" lnSpcReduction="10000"/>
           </a:bodyPr>
           <a:lstStyle>
             <a:lvl1pPr marL="228600" indent="-228600" algn="l" defTabSz="914400" rtl="0" eaLnBrk="1" latinLnBrk="0" hangingPunct="1">
@@ -4138,16 +4139,106 @@
                 </a:solidFill>
                 <a:latin typeface="Myriad "/>
               </a:rPr>
-              <a:t> </a:t>
-            </a:r>
-            <a:r>
-              <a:rPr lang="hu-HU" sz="2200" dirty="0" err="1">
-                <a:solidFill>
-                  <a:srgbClr val="002060"/>
-                </a:solidFill>
-                <a:latin typeface="Myriad "/>
-              </a:rPr>
-              <a:t>used</a:t>
+              <a:t>. Best </a:t>
+            </a:r>
+            <a:r>
+              <a:rPr lang="hu-HU" sz="2200" dirty="0" err="1">
+                <a:solidFill>
+                  <a:srgbClr val="002060"/>
+                </a:solidFill>
+                <a:latin typeface="Myriad "/>
+              </a:rPr>
+              <a:t>performers</a:t>
+            </a:r>
+            <a:r>
+              <a:rPr lang="hu-HU" sz="2200" dirty="0">
+                <a:solidFill>
+                  <a:srgbClr val="002060"/>
+                </a:solidFill>
+                <a:latin typeface="Myriad "/>
+              </a:rPr>
+              <a:t> </a:t>
+            </a:r>
+            <a:r>
+              <a:rPr lang="hu-HU" sz="2200" dirty="0" err="1">
+                <a:solidFill>
+                  <a:srgbClr val="002060"/>
+                </a:solidFill>
+                <a:latin typeface="Myriad "/>
+              </a:rPr>
+              <a:t>seem</a:t>
+            </a:r>
+            <a:r>
+              <a:rPr lang="hu-HU" sz="2200" dirty="0">
+                <a:solidFill>
+                  <a:srgbClr val="002060"/>
+                </a:solidFill>
+                <a:latin typeface="Myriad "/>
+              </a:rPr>
+              <a:t> </a:t>
+            </a:r>
+            <a:r>
+              <a:rPr lang="hu-HU" sz="2200" dirty="0" err="1">
+                <a:solidFill>
+                  <a:srgbClr val="002060"/>
+                </a:solidFill>
+                <a:latin typeface="Myriad "/>
+              </a:rPr>
+              <a:t>to</a:t>
+            </a:r>
+            <a:r>
+              <a:rPr lang="hu-HU" sz="2200" dirty="0">
+                <a:solidFill>
+                  <a:srgbClr val="002060"/>
+                </a:solidFill>
+                <a:latin typeface="Myriad "/>
+              </a:rPr>
+              <a:t> be </a:t>
+            </a:r>
+            <a:r>
+              <a:rPr lang="hu-HU" sz="2200" dirty="0" err="1">
+                <a:solidFill>
+                  <a:srgbClr val="002060"/>
+                </a:solidFill>
+                <a:latin typeface="Myriad "/>
+              </a:rPr>
+              <a:t>boosted</a:t>
+            </a:r>
+            <a:r>
+              <a:rPr lang="hu-HU" sz="2200" dirty="0">
+                <a:solidFill>
+                  <a:srgbClr val="002060"/>
+                </a:solidFill>
+                <a:latin typeface="Myriad "/>
+              </a:rPr>
+              <a:t> random </a:t>
+            </a:r>
+            <a:r>
+              <a:rPr lang="hu-HU" sz="2200" dirty="0" err="1">
+                <a:solidFill>
+                  <a:srgbClr val="002060"/>
+                </a:solidFill>
+                <a:latin typeface="Myriad "/>
+              </a:rPr>
+              <a:t>forest</a:t>
+            </a:r>
+            <a:r>
+              <a:rPr lang="hu-HU" sz="2200" dirty="0">
+                <a:solidFill>
+                  <a:srgbClr val="002060"/>
+                </a:solidFill>
+                <a:latin typeface="Myriad "/>
+              </a:rPr>
+              <a:t> </a:t>
+            </a:r>
+            <a:r>
+              <a:rPr lang="hu-HU" sz="2200" dirty="0" err="1">
+                <a:solidFill>
+                  <a:srgbClr val="002060"/>
+                </a:solidFill>
+                <a:latin typeface="Myriad "/>
+              </a:rPr>
+              <a:t>regressions</a:t>
             </a:r>
             <a:r>
               <a:rPr lang="hu-HU" sz="2200" dirty="0">
@@ -8311,7 +8402,7 @@
                 </a:solidFill>
                 <a:latin typeface="Myriad "/>
               </a:rPr>
-              <a:t>Avarage</a:t>
+              <a:t>Average</a:t>
             </a:r>
             <a:r>
               <a:rPr lang="hu-HU" sz="1400" dirty="0">
@@ -8548,7 +8639,7 @@
                 </a:solidFill>
                 <a:latin typeface="Myriad "/>
               </a:rPr>
-              <a:t>avearge</a:t>
+              <a:t>average</a:t>
             </a:r>
             <a:r>
               <a:rPr lang="hu-HU" sz="1400" dirty="0">
@@ -8723,8 +8814,8 @@
         </p:nvSpPr>
         <p:spPr>
           <a:xfrm>
-            <a:off x="838200" y="1447529"/>
-            <a:ext cx="10515600" cy="2623539"/>
+            <a:off x="617527" y="1656218"/>
+            <a:ext cx="5809090" cy="4076672"/>
           </a:xfrm>
         </p:spPr>
         <p:txBody>
@@ -8741,25 +8832,133 @@
                 </a:solidFill>
                 <a:latin typeface="Myriad "/>
               </a:rPr>
-              <a:t>This</a:t>
-            </a:r>
-            <a:r>
-              <a:rPr lang="hu-HU" sz="1800" dirty="0">
-                <a:solidFill>
-                  <a:srgbClr val="002060"/>
-                </a:solidFill>
-                <a:latin typeface="Myriad "/>
-              </a:rPr>
-              <a:t> </a:t>
-            </a:r>
-            <a:r>
-              <a:rPr lang="hu-HU" sz="1800" dirty="0" err="1">
-                <a:solidFill>
-                  <a:srgbClr val="002060"/>
-                </a:solidFill>
-                <a:latin typeface="Myriad "/>
-              </a:rPr>
-              <a:t>method</a:t>
+              <a:t>Model</a:t>
+            </a:r>
+            <a:r>
+              <a:rPr lang="hu-HU" sz="1800" dirty="0">
+                <a:solidFill>
+                  <a:srgbClr val="002060"/>
+                </a:solidFill>
+                <a:latin typeface="Myriad "/>
+              </a:rPr>
+              <a:t> </a:t>
+            </a:r>
+            <a:r>
+              <a:rPr lang="hu-HU" sz="1800" dirty="0" err="1">
+                <a:solidFill>
+                  <a:srgbClr val="002060"/>
+                </a:solidFill>
+                <a:latin typeface="Myriad "/>
+              </a:rPr>
+              <a:t>selection</a:t>
+            </a:r>
+            <a:r>
+              <a:rPr lang="hu-HU" sz="1800" dirty="0">
+                <a:solidFill>
+                  <a:srgbClr val="002060"/>
+                </a:solidFill>
+                <a:latin typeface="Myriad "/>
+              </a:rPr>
+              <a:t>: </a:t>
+            </a:r>
+            <a:r>
+              <a:rPr lang="hu-HU" sz="1800" dirty="0" err="1">
+                <a:solidFill>
+                  <a:srgbClr val="002060"/>
+                </a:solidFill>
+                <a:latin typeface="Myriad "/>
+              </a:rPr>
+              <a:t>after</a:t>
+            </a:r>
+            <a:r>
+              <a:rPr lang="hu-HU" sz="1800" dirty="0">
+                <a:solidFill>
+                  <a:srgbClr val="002060"/>
+                </a:solidFill>
+                <a:latin typeface="Myriad "/>
+              </a:rPr>
+              <a:t> </a:t>
+            </a:r>
+            <a:r>
+              <a:rPr lang="hu-HU" sz="1800" dirty="0" err="1">
+                <a:solidFill>
+                  <a:srgbClr val="002060"/>
+                </a:solidFill>
+                <a:latin typeface="Myriad "/>
+              </a:rPr>
+              <a:t>hyperparameter</a:t>
+            </a:r>
+            <a:r>
+              <a:rPr lang="hu-HU" sz="1800" dirty="0">
+                <a:solidFill>
+                  <a:srgbClr val="002060"/>
+                </a:solidFill>
+                <a:latin typeface="Myriad "/>
+              </a:rPr>
+              <a:t> </a:t>
+            </a:r>
+            <a:r>
+              <a:rPr lang="hu-HU" sz="1800" dirty="0" err="1">
+                <a:solidFill>
+                  <a:srgbClr val="002060"/>
+                </a:solidFill>
+                <a:latin typeface="Myriad "/>
+              </a:rPr>
+              <a:t>tuning</a:t>
+            </a:r>
+            <a:r>
+              <a:rPr lang="hu-HU" sz="1800" dirty="0">
+                <a:solidFill>
+                  <a:srgbClr val="002060"/>
+                </a:solidFill>
+                <a:latin typeface="Myriad "/>
+              </a:rPr>
+              <a:t> </a:t>
+            </a:r>
+            <a:r>
+              <a:rPr lang="hu-HU" sz="1800" dirty="0" err="1">
+                <a:solidFill>
+                  <a:srgbClr val="002060"/>
+                </a:solidFill>
+                <a:latin typeface="Myriad "/>
+              </a:rPr>
+              <a:t>the</a:t>
+            </a:r>
+            <a:r>
+              <a:rPr lang="hu-HU" sz="1800" dirty="0">
+                <a:solidFill>
+                  <a:srgbClr val="002060"/>
+                </a:solidFill>
+                <a:latin typeface="Myriad "/>
+              </a:rPr>
+              <a:t> </a:t>
+            </a:r>
+            <a:r>
+              <a:rPr lang="hu-HU" sz="1800" dirty="0" err="1">
+                <a:solidFill>
+                  <a:srgbClr val="002060"/>
+                </a:solidFill>
+                <a:latin typeface="Myriad "/>
+              </a:rPr>
+              <a:t>next</a:t>
+            </a:r>
+            <a:r>
+              <a:rPr lang="hu-HU" sz="1800" dirty="0">
+                <a:solidFill>
+                  <a:srgbClr val="002060"/>
+                </a:solidFill>
+                <a:latin typeface="Myriad "/>
+              </a:rPr>
+              <a:t> </a:t>
+            </a:r>
+            <a:r>
+              <a:rPr lang="hu-HU" sz="1800" dirty="0" err="1">
+                <a:solidFill>
+                  <a:srgbClr val="002060"/>
+                </a:solidFill>
+                <a:latin typeface="Myriad "/>
+              </a:rPr>
+              <a:t>step</a:t>
             </a:r>
             <a:r>
               <a:rPr lang="hu-HU" sz="1800" dirty="0">
@@ -8777,187 +8976,298 @@
                 </a:solidFill>
                 <a:latin typeface="Myriad "/>
               </a:rPr>
-              <a:t>still</a:t>
-            </a:r>
-            <a:r>
-              <a:rPr lang="hu-HU" sz="1800" dirty="0">
-                <a:solidFill>
-                  <a:srgbClr val="002060"/>
-                </a:solidFill>
-                <a:latin typeface="Myriad "/>
-              </a:rPr>
-              <a:t> </a:t>
-            </a:r>
-            <a:r>
-              <a:rPr lang="hu-HU" sz="1800" dirty="0" err="1">
-                <a:solidFill>
-                  <a:srgbClr val="002060"/>
-                </a:solidFill>
-                <a:latin typeface="Myriad "/>
-              </a:rPr>
-              <a:t>under</a:t>
-            </a:r>
-            <a:r>
-              <a:rPr lang="hu-HU" sz="1800" dirty="0">
-                <a:solidFill>
-                  <a:srgbClr val="002060"/>
-                </a:solidFill>
-                <a:latin typeface="Myriad "/>
-              </a:rPr>
-              <a:t> </a:t>
-            </a:r>
-            <a:r>
-              <a:rPr lang="hu-HU" sz="1800" dirty="0" err="1">
-                <a:solidFill>
-                  <a:srgbClr val="002060"/>
-                </a:solidFill>
-                <a:latin typeface="Myriad "/>
-              </a:rPr>
-              <a:t>development</a:t>
-            </a:r>
-            <a:r>
-              <a:rPr lang="hu-HU" sz="1800" dirty="0">
-                <a:solidFill>
-                  <a:srgbClr val="002060"/>
-                </a:solidFill>
-                <a:latin typeface="Myriad "/>
-              </a:rPr>
-              <a:t>.</a:t>
-            </a:r>
-            <a:endParaRPr lang="hu-HU" sz="1400" dirty="0">
-              <a:solidFill>
-                <a:srgbClr val="002060"/>
-              </a:solidFill>
-              <a:latin typeface="Myriad "/>
-            </a:endParaRPr>
+              <a:t>to</a:t>
+            </a:r>
+            <a:r>
+              <a:rPr lang="hu-HU" sz="1800" dirty="0">
+                <a:solidFill>
+                  <a:srgbClr val="002060"/>
+                </a:solidFill>
+                <a:latin typeface="Myriad "/>
+              </a:rPr>
+              <a:t> </a:t>
+            </a:r>
+            <a:r>
+              <a:rPr lang="hu-HU" sz="1800" dirty="0" err="1">
+                <a:solidFill>
+                  <a:srgbClr val="002060"/>
+                </a:solidFill>
+                <a:latin typeface="Myriad "/>
+              </a:rPr>
+              <a:t>select</a:t>
+            </a:r>
+            <a:r>
+              <a:rPr lang="hu-HU" sz="1800" dirty="0">
+                <a:solidFill>
+                  <a:srgbClr val="002060"/>
+                </a:solidFill>
+                <a:latin typeface="Myriad "/>
+              </a:rPr>
+              <a:t> </a:t>
+            </a:r>
+            <a:r>
+              <a:rPr lang="hu-HU" sz="1800" dirty="0" err="1">
+                <a:solidFill>
+                  <a:srgbClr val="002060"/>
+                </a:solidFill>
+                <a:latin typeface="Myriad "/>
+              </a:rPr>
+              <a:t>the</a:t>
+            </a:r>
+            <a:r>
+              <a:rPr lang="hu-HU" sz="1800" dirty="0">
+                <a:solidFill>
+                  <a:srgbClr val="002060"/>
+                </a:solidFill>
+                <a:latin typeface="Myriad "/>
+              </a:rPr>
+              <a:t> </a:t>
+            </a:r>
+            <a:r>
+              <a:rPr lang="hu-HU" sz="1800" dirty="0" err="1">
+                <a:solidFill>
+                  <a:srgbClr val="002060"/>
+                </a:solidFill>
+                <a:latin typeface="Myriad "/>
+              </a:rPr>
+              <a:t>best</a:t>
+            </a:r>
+            <a:r>
+              <a:rPr lang="hu-HU" sz="1800" dirty="0">
+                <a:solidFill>
+                  <a:srgbClr val="002060"/>
+                </a:solidFill>
+                <a:latin typeface="Myriad "/>
+              </a:rPr>
+              <a:t> </a:t>
+            </a:r>
+            <a:r>
+              <a:rPr lang="hu-HU" sz="1800" dirty="0" err="1">
+                <a:solidFill>
+                  <a:srgbClr val="002060"/>
+                </a:solidFill>
+                <a:latin typeface="Myriad "/>
+              </a:rPr>
+              <a:t>performing</a:t>
+            </a:r>
+            <a:r>
+              <a:rPr lang="hu-HU" sz="1800" dirty="0">
+                <a:solidFill>
+                  <a:srgbClr val="002060"/>
+                </a:solidFill>
+                <a:latin typeface="Myriad "/>
+              </a:rPr>
+              <a:t> </a:t>
+            </a:r>
+            <a:r>
+              <a:rPr lang="hu-HU" sz="1800" dirty="0" err="1">
+                <a:solidFill>
+                  <a:srgbClr val="002060"/>
+                </a:solidFill>
+                <a:latin typeface="Myriad "/>
+              </a:rPr>
+              <a:t>models</a:t>
+            </a:r>
+            <a:r>
+              <a:rPr lang="hu-HU" sz="1800" dirty="0">
+                <a:solidFill>
+                  <a:srgbClr val="002060"/>
+                </a:solidFill>
+                <a:latin typeface="Myriad "/>
+              </a:rPr>
+              <a:t> out of </a:t>
+            </a:r>
+            <a:r>
+              <a:rPr lang="hu-HU" sz="1800" dirty="0" err="1">
+                <a:solidFill>
+                  <a:srgbClr val="002060"/>
+                </a:solidFill>
+                <a:latin typeface="Myriad "/>
+              </a:rPr>
+              <a:t>the</a:t>
+            </a:r>
+            <a:r>
+              <a:rPr lang="hu-HU" sz="1800" dirty="0">
+                <a:solidFill>
+                  <a:srgbClr val="002060"/>
+                </a:solidFill>
+                <a:latin typeface="Myriad "/>
+              </a:rPr>
+              <a:t> </a:t>
+            </a:r>
+            <a:r>
+              <a:rPr lang="hu-HU" sz="1800" dirty="0" err="1">
+                <a:solidFill>
+                  <a:srgbClr val="002060"/>
+                </a:solidFill>
+                <a:latin typeface="Myriad "/>
+              </a:rPr>
+              <a:t>estimated</a:t>
+            </a:r>
+            <a:r>
+              <a:rPr lang="hu-HU" sz="1800" dirty="0">
+                <a:solidFill>
+                  <a:srgbClr val="002060"/>
+                </a:solidFill>
+                <a:latin typeface="Myriad "/>
+              </a:rPr>
+              <a:t> 70 (5 </a:t>
+            </a:r>
+            <a:r>
+              <a:rPr lang="hu-HU" sz="1800" dirty="0" err="1">
+                <a:solidFill>
+                  <a:srgbClr val="002060"/>
+                </a:solidFill>
+                <a:latin typeface="Myriad "/>
+              </a:rPr>
+              <a:t>time</a:t>
+            </a:r>
+            <a:r>
+              <a:rPr lang="hu-HU" sz="1800" dirty="0">
+                <a:solidFill>
+                  <a:srgbClr val="002060"/>
+                </a:solidFill>
+                <a:latin typeface="Myriad "/>
+              </a:rPr>
+              <a:t> </a:t>
+            </a:r>
+            <a:r>
+              <a:rPr lang="hu-HU" sz="1800" dirty="0" err="1">
+                <a:solidFill>
+                  <a:srgbClr val="002060"/>
+                </a:solidFill>
+                <a:latin typeface="Myriad "/>
+              </a:rPr>
+              <a:t>splits</a:t>
+            </a:r>
+            <a:r>
+              <a:rPr lang="hu-HU" sz="1800" dirty="0">
+                <a:solidFill>
+                  <a:srgbClr val="002060"/>
+                </a:solidFill>
+                <a:latin typeface="Myriad "/>
+              </a:rPr>
+              <a:t> x 2 </a:t>
+            </a:r>
+            <a:r>
+              <a:rPr lang="hu-HU" sz="1800" dirty="0" err="1">
+                <a:solidFill>
+                  <a:srgbClr val="002060"/>
+                </a:solidFill>
+                <a:latin typeface="Myriad "/>
+              </a:rPr>
+              <a:t>time</a:t>
+            </a:r>
+            <a:r>
+              <a:rPr lang="hu-HU" sz="1800" dirty="0">
+                <a:solidFill>
+                  <a:srgbClr val="002060"/>
+                </a:solidFill>
+                <a:latin typeface="Myriad "/>
+              </a:rPr>
+              <a:t> </a:t>
+            </a:r>
+            <a:r>
+              <a:rPr lang="hu-HU" sz="1800" dirty="0" err="1">
+                <a:solidFill>
+                  <a:srgbClr val="002060"/>
+                </a:solidFill>
+                <a:latin typeface="Myriad "/>
+              </a:rPr>
+              <a:t>windows</a:t>
+            </a:r>
+            <a:r>
+              <a:rPr lang="hu-HU" sz="1800" dirty="0">
+                <a:solidFill>
+                  <a:srgbClr val="002060"/>
+                </a:solidFill>
+                <a:latin typeface="Myriad "/>
+              </a:rPr>
+              <a:t> x 7 </a:t>
+            </a:r>
+            <a:r>
+              <a:rPr lang="hu-HU" sz="1800" dirty="0" err="1">
+                <a:solidFill>
+                  <a:srgbClr val="002060"/>
+                </a:solidFill>
+                <a:latin typeface="Myriad "/>
+              </a:rPr>
+              <a:t>models</a:t>
+            </a:r>
+            <a:r>
+              <a:rPr lang="hu-HU" sz="1800" dirty="0">
+                <a:solidFill>
+                  <a:srgbClr val="002060"/>
+                </a:solidFill>
+                <a:latin typeface="Myriad "/>
+              </a:rPr>
+              <a:t>)</a:t>
+            </a:r>
           </a:p>
           <a:p>
             <a:pPr algn="just"/>
             <a:r>
-              <a:rPr lang="hu-HU" sz="1800" dirty="0">
-                <a:solidFill>
-                  <a:srgbClr val="002060"/>
-                </a:solidFill>
-                <a:latin typeface="Myriad "/>
-              </a:rPr>
-              <a:t>The </a:t>
-            </a:r>
-            <a:r>
-              <a:rPr lang="hu-HU" sz="1800" dirty="0" err="1">
-                <a:solidFill>
-                  <a:srgbClr val="002060"/>
-                </a:solidFill>
-                <a:latin typeface="Myriad "/>
-              </a:rPr>
-              <a:t>results</a:t>
-            </a:r>
-            <a:r>
-              <a:rPr lang="hu-HU" sz="1800" dirty="0">
-                <a:solidFill>
-                  <a:srgbClr val="002060"/>
-                </a:solidFill>
-                <a:latin typeface="Myriad "/>
-              </a:rPr>
-              <a:t> </a:t>
-            </a:r>
-            <a:r>
-              <a:rPr lang="hu-HU" sz="1800" dirty="0" err="1">
-                <a:solidFill>
-                  <a:srgbClr val="002060"/>
-                </a:solidFill>
-                <a:latin typeface="Myriad "/>
-              </a:rPr>
-              <a:t>for</a:t>
-            </a:r>
-            <a:r>
-              <a:rPr lang="hu-HU" sz="1800" dirty="0">
-                <a:solidFill>
-                  <a:srgbClr val="002060"/>
-                </a:solidFill>
-                <a:latin typeface="Myriad "/>
-              </a:rPr>
-              <a:t> </a:t>
-            </a:r>
-            <a:r>
-              <a:rPr lang="hu-HU" sz="1800" dirty="0" err="1">
-                <a:solidFill>
-                  <a:srgbClr val="002060"/>
-                </a:solidFill>
-                <a:latin typeface="Myriad "/>
-              </a:rPr>
-              <a:t>several</a:t>
-            </a:r>
-            <a:r>
-              <a:rPr lang="hu-HU" sz="1800" dirty="0">
-                <a:solidFill>
-                  <a:srgbClr val="002060"/>
-                </a:solidFill>
-                <a:latin typeface="Myriad "/>
-              </a:rPr>
-              <a:t> </a:t>
-            </a:r>
-            <a:r>
-              <a:rPr lang="hu-HU" sz="1800" dirty="0" err="1">
-                <a:solidFill>
-                  <a:srgbClr val="002060"/>
-                </a:solidFill>
-                <a:latin typeface="Myriad "/>
-              </a:rPr>
-              <a:t>countries</a:t>
-            </a:r>
-            <a:r>
-              <a:rPr lang="hu-HU" sz="1800" dirty="0">
-                <a:solidFill>
-                  <a:srgbClr val="002060"/>
-                </a:solidFill>
-                <a:latin typeface="Myriad "/>
-              </a:rPr>
-              <a:t> </a:t>
-            </a:r>
-            <a:r>
-              <a:rPr lang="hu-HU" sz="1800" dirty="0" err="1">
-                <a:solidFill>
-                  <a:srgbClr val="002060"/>
-                </a:solidFill>
-                <a:latin typeface="Myriad "/>
-              </a:rPr>
-              <a:t>suggest</a:t>
-            </a:r>
-            <a:r>
-              <a:rPr lang="hu-HU" sz="1800" dirty="0">
-                <a:solidFill>
-                  <a:srgbClr val="002060"/>
-                </a:solidFill>
-                <a:latin typeface="Myriad "/>
-              </a:rPr>
-              <a:t> </a:t>
-            </a:r>
-            <a:r>
-              <a:rPr lang="hu-HU" sz="1800" dirty="0" err="1">
-                <a:solidFill>
-                  <a:srgbClr val="002060"/>
-                </a:solidFill>
-                <a:latin typeface="Myriad "/>
-              </a:rPr>
-              <a:t>us</a:t>
-            </a:r>
-            <a:r>
-              <a:rPr lang="hu-HU" sz="1800" dirty="0">
-                <a:solidFill>
-                  <a:srgbClr val="002060"/>
-                </a:solidFill>
-                <a:latin typeface="Myriad "/>
-              </a:rPr>
-              <a:t> </a:t>
-            </a:r>
-            <a:r>
-              <a:rPr lang="hu-HU" sz="1800" dirty="0" err="1">
-                <a:solidFill>
-                  <a:srgbClr val="002060"/>
-                </a:solidFill>
-                <a:latin typeface="Myriad "/>
-              </a:rPr>
-              <a:t>that</a:t>
+              <a:rPr lang="hu-HU" sz="1800" dirty="0" err="1">
+                <a:solidFill>
+                  <a:srgbClr val="002060"/>
+                </a:solidFill>
+                <a:latin typeface="Myriad "/>
+              </a:rPr>
+              <a:t>Model</a:t>
+            </a:r>
+            <a:r>
+              <a:rPr lang="hu-HU" sz="1800" dirty="0">
+                <a:solidFill>
+                  <a:srgbClr val="002060"/>
+                </a:solidFill>
+                <a:latin typeface="Myriad "/>
+              </a:rPr>
+              <a:t> </a:t>
+            </a:r>
+            <a:r>
+              <a:rPr lang="hu-HU" sz="1800" dirty="0" err="1">
+                <a:solidFill>
+                  <a:srgbClr val="002060"/>
+                </a:solidFill>
+                <a:latin typeface="Myriad "/>
+              </a:rPr>
+              <a:t>selection</a:t>
+            </a:r>
+            <a:r>
+              <a:rPr lang="hu-HU" sz="1800" dirty="0">
+                <a:solidFill>
+                  <a:srgbClr val="002060"/>
+                </a:solidFill>
+                <a:latin typeface="Myriad "/>
+              </a:rPr>
+              <a:t> is </a:t>
+            </a:r>
+            <a:r>
+              <a:rPr lang="hu-HU" sz="1800" dirty="0" err="1">
+                <a:solidFill>
+                  <a:srgbClr val="002060"/>
+                </a:solidFill>
+                <a:latin typeface="Myriad "/>
+              </a:rPr>
+              <a:t>done</a:t>
+            </a:r>
+            <a:r>
+              <a:rPr lang="hu-HU" sz="1800" dirty="0">
+                <a:solidFill>
+                  <a:srgbClr val="002060"/>
+                </a:solidFill>
+                <a:latin typeface="Myriad "/>
+              </a:rPr>
+              <a:t> </a:t>
+            </a:r>
+            <a:r>
+              <a:rPr lang="hu-HU" sz="1800" dirty="0" err="1">
+                <a:solidFill>
+                  <a:srgbClr val="002060"/>
+                </a:solidFill>
+                <a:latin typeface="Myriad "/>
+              </a:rPr>
+              <a:t>on</a:t>
             </a:r>
             <a:r>
               <a:rPr lang="hu-HU" sz="1800" dirty="0">
@@ -8984,34 +9294,16 @@
                 </a:solidFill>
                 <a:latin typeface="Myriad "/>
               </a:rPr>
-              <a:t> </a:t>
-            </a:r>
-            <a:r>
-              <a:rPr lang="hu-HU" sz="1800" dirty="0" err="1">
-                <a:solidFill>
-                  <a:srgbClr val="002060"/>
-                </a:solidFill>
-                <a:latin typeface="Myriad "/>
-              </a:rPr>
-              <a:t>direction</a:t>
-            </a:r>
-            <a:r>
-              <a:rPr lang="hu-HU" sz="1800" dirty="0">
-                <a:solidFill>
-                  <a:srgbClr val="002060"/>
-                </a:solidFill>
-                <a:latin typeface="Myriad "/>
-              </a:rPr>
-              <a:t> is </a:t>
-            </a:r>
-            <a:r>
-              <a:rPr lang="hu-HU" sz="1800" dirty="0" err="1">
-                <a:solidFill>
-                  <a:srgbClr val="002060"/>
-                </a:solidFill>
-                <a:latin typeface="Myriad "/>
-              </a:rPr>
-              <a:t>good</a:t>
+              <a:t> test </a:t>
+            </a:r>
+            <a:r>
+              <a:rPr lang="hu-HU" sz="1800" dirty="0" err="1">
+                <a:solidFill>
+                  <a:srgbClr val="002060"/>
+                </a:solidFill>
+                <a:latin typeface="Myriad "/>
+              </a:rPr>
+              <a:t>set</a:t>
             </a:r>
             <a:r>
               <a:rPr lang="hu-HU" sz="1800" dirty="0">
@@ -9029,442 +9321,115 @@
                 </a:solidFill>
                 <a:latin typeface="Myriad "/>
               </a:rPr>
-              <a:t>but</a:t>
-            </a:r>
-            <a:r>
-              <a:rPr lang="hu-HU" sz="1800" dirty="0">
-                <a:solidFill>
-                  <a:srgbClr val="002060"/>
-                </a:solidFill>
-                <a:latin typeface="Myriad "/>
-              </a:rPr>
-              <a:t> </a:t>
-            </a:r>
-            <a:r>
-              <a:rPr lang="hu-HU" sz="1800" dirty="0" err="1">
-                <a:solidFill>
-                  <a:srgbClr val="002060"/>
-                </a:solidFill>
-                <a:latin typeface="Myriad "/>
-              </a:rPr>
-              <a:t>we</a:t>
-            </a:r>
-            <a:r>
-              <a:rPr lang="hu-HU" sz="1800" dirty="0">
-                <a:solidFill>
-                  <a:srgbClr val="002060"/>
-                </a:solidFill>
-                <a:latin typeface="Myriad "/>
-              </a:rPr>
-              <a:t> </a:t>
-            </a:r>
-            <a:r>
-              <a:rPr lang="hu-HU" sz="1800" dirty="0" err="1">
-                <a:solidFill>
-                  <a:srgbClr val="002060"/>
-                </a:solidFill>
-                <a:latin typeface="Myriad "/>
-              </a:rPr>
-              <a:t>need</a:t>
-            </a:r>
-            <a:r>
-              <a:rPr lang="hu-HU" sz="1800" dirty="0">
-                <a:solidFill>
-                  <a:srgbClr val="002060"/>
-                </a:solidFill>
-                <a:latin typeface="Myriad "/>
-              </a:rPr>
-              <a:t> </a:t>
-            </a:r>
-            <a:r>
-              <a:rPr lang="hu-HU" sz="1800" dirty="0" err="1">
-                <a:solidFill>
-                  <a:srgbClr val="002060"/>
-                </a:solidFill>
-                <a:latin typeface="Myriad "/>
-              </a:rPr>
-              <a:t>some</a:t>
-            </a:r>
-            <a:r>
-              <a:rPr lang="hu-HU" sz="1800" dirty="0">
-                <a:solidFill>
-                  <a:srgbClr val="002060"/>
-                </a:solidFill>
-                <a:latin typeface="Myriad "/>
-              </a:rPr>
-              <a:t> </a:t>
-            </a:r>
-            <a:r>
-              <a:rPr lang="hu-HU" sz="1800" dirty="0" err="1">
-                <a:solidFill>
-                  <a:srgbClr val="002060"/>
-                </a:solidFill>
-                <a:latin typeface="Myriad "/>
-              </a:rPr>
-              <a:t>further</a:t>
-            </a:r>
-            <a:r>
-              <a:rPr lang="hu-HU" sz="1800" dirty="0">
-                <a:solidFill>
-                  <a:srgbClr val="002060"/>
-                </a:solidFill>
-                <a:latin typeface="Myriad "/>
-              </a:rPr>
-              <a:t> </a:t>
-            </a:r>
-            <a:r>
-              <a:rPr lang="hu-HU" sz="1800" dirty="0" err="1">
-                <a:solidFill>
-                  <a:srgbClr val="002060"/>
-                </a:solidFill>
-                <a:latin typeface="Myriad "/>
-              </a:rPr>
-              <a:t>tweaks</a:t>
-            </a:r>
-            <a:r>
-              <a:rPr lang="hu-HU" sz="1800" dirty="0">
-                <a:solidFill>
-                  <a:srgbClr val="002060"/>
-                </a:solidFill>
-                <a:latin typeface="Myriad "/>
-              </a:rPr>
-              <a:t> </a:t>
-            </a:r>
-            <a:r>
-              <a:rPr lang="hu-HU" sz="1800" dirty="0" err="1">
-                <a:solidFill>
-                  <a:srgbClr val="002060"/>
-                </a:solidFill>
-                <a:latin typeface="Myriad "/>
-              </a:rPr>
-              <a:t>to</a:t>
-            </a:r>
-            <a:r>
-              <a:rPr lang="hu-HU" sz="1800" dirty="0">
-                <a:solidFill>
-                  <a:srgbClr val="002060"/>
-                </a:solidFill>
-                <a:latin typeface="Myriad "/>
-              </a:rPr>
-              <a:t> </a:t>
-            </a:r>
-            <a:r>
-              <a:rPr lang="hu-HU" sz="1800" dirty="0" err="1">
-                <a:solidFill>
-                  <a:srgbClr val="002060"/>
-                </a:solidFill>
-                <a:latin typeface="Myriad "/>
-              </a:rPr>
-              <a:t>reach</a:t>
-            </a:r>
-            <a:r>
-              <a:rPr lang="hu-HU" sz="1800" dirty="0">
-                <a:solidFill>
-                  <a:srgbClr val="002060"/>
-                </a:solidFill>
-                <a:latin typeface="Myriad "/>
-              </a:rPr>
-              <a:t> a </a:t>
-            </a:r>
-            <a:r>
-              <a:rPr lang="hu-HU" sz="1800" dirty="0" err="1">
-                <a:solidFill>
-                  <a:srgbClr val="002060"/>
-                </a:solidFill>
-                <a:latin typeface="Myriad "/>
-              </a:rPr>
-              <a:t>generally</a:t>
-            </a:r>
-            <a:r>
-              <a:rPr lang="hu-HU" sz="1800" dirty="0">
-                <a:solidFill>
-                  <a:srgbClr val="002060"/>
-                </a:solidFill>
-                <a:latin typeface="Myriad "/>
-              </a:rPr>
-              <a:t> </a:t>
-            </a:r>
-            <a:r>
-              <a:rPr lang="hu-HU" sz="1800" dirty="0" err="1">
-                <a:solidFill>
-                  <a:srgbClr val="002060"/>
-                </a:solidFill>
-                <a:latin typeface="Myriad "/>
-              </a:rPr>
-              <a:t>well</a:t>
-            </a:r>
-            <a:r>
-              <a:rPr lang="hu-HU" sz="1800" dirty="0">
-                <a:solidFill>
-                  <a:srgbClr val="002060"/>
-                </a:solidFill>
-                <a:latin typeface="Myriad "/>
-              </a:rPr>
-              <a:t> </a:t>
-            </a:r>
-            <a:r>
-              <a:rPr lang="hu-HU" sz="1800" dirty="0" err="1">
-                <a:solidFill>
-                  <a:srgbClr val="002060"/>
-                </a:solidFill>
-                <a:latin typeface="Myriad "/>
-              </a:rPr>
-              <a:t>behaving</a:t>
-            </a:r>
-            <a:r>
-              <a:rPr lang="hu-HU" sz="1800" dirty="0">
-                <a:solidFill>
-                  <a:srgbClr val="002060"/>
-                </a:solidFill>
-                <a:latin typeface="Myriad "/>
-              </a:rPr>
-              <a:t> estimator.</a:t>
-            </a:r>
-          </a:p>
-          <a:p>
-            <a:pPr algn="just"/>
-            <a:r>
-              <a:rPr lang="hu-HU" sz="1800" dirty="0" err="1">
-                <a:solidFill>
-                  <a:srgbClr val="002060"/>
-                </a:solidFill>
-                <a:latin typeface="Myriad "/>
-              </a:rPr>
-              <a:t>Comparing</a:t>
-            </a:r>
-            <a:r>
-              <a:rPr lang="hu-HU" sz="1800" dirty="0">
-                <a:solidFill>
-                  <a:srgbClr val="002060"/>
-                </a:solidFill>
-                <a:latin typeface="Myriad "/>
-              </a:rPr>
-              <a:t> </a:t>
-            </a:r>
-            <a:r>
-              <a:rPr lang="hu-HU" sz="1800" dirty="0" err="1">
-                <a:solidFill>
-                  <a:srgbClr val="002060"/>
-                </a:solidFill>
-                <a:latin typeface="Myriad "/>
-              </a:rPr>
-              <a:t>our</a:t>
-            </a:r>
-            <a:r>
-              <a:rPr lang="hu-HU" sz="1800" dirty="0">
-                <a:solidFill>
-                  <a:srgbClr val="002060"/>
-                </a:solidFill>
-                <a:latin typeface="Myriad "/>
-              </a:rPr>
-              <a:t> top 5 </a:t>
-            </a:r>
-            <a:r>
-              <a:rPr lang="hu-HU" sz="1800" dirty="0" err="1">
-                <a:solidFill>
-                  <a:srgbClr val="002060"/>
-                </a:solidFill>
-                <a:latin typeface="Myriad "/>
-              </a:rPr>
-              <a:t>predictions</a:t>
-            </a:r>
-            <a:r>
-              <a:rPr lang="hu-HU" sz="1800" dirty="0">
-                <a:solidFill>
-                  <a:srgbClr val="002060"/>
-                </a:solidFill>
-                <a:latin typeface="Myriad "/>
-              </a:rPr>
-              <a:t> </a:t>
-            </a:r>
-            <a:r>
-              <a:rPr lang="hu-HU" sz="1800" dirty="0" err="1">
-                <a:solidFill>
-                  <a:srgbClr val="002060"/>
-                </a:solidFill>
-                <a:latin typeface="Myriad "/>
-              </a:rPr>
-              <a:t>between</a:t>
-            </a:r>
-            <a:r>
-              <a:rPr lang="hu-HU" sz="1800" dirty="0">
-                <a:solidFill>
-                  <a:srgbClr val="002060"/>
-                </a:solidFill>
-                <a:latin typeface="Myriad "/>
-              </a:rPr>
-              <a:t> November and </a:t>
-            </a:r>
-            <a:r>
-              <a:rPr lang="hu-HU" sz="1800" dirty="0" err="1">
-                <a:solidFill>
-                  <a:srgbClr val="002060"/>
-                </a:solidFill>
-                <a:latin typeface="Myriad "/>
-              </a:rPr>
-              <a:t>April</a:t>
-            </a:r>
-            <a:r>
-              <a:rPr lang="hu-HU" sz="1800" dirty="0">
-                <a:solidFill>
-                  <a:srgbClr val="002060"/>
-                </a:solidFill>
-                <a:latin typeface="Myriad "/>
-              </a:rPr>
-              <a:t> </a:t>
-            </a:r>
-            <a:r>
-              <a:rPr lang="hu-HU" sz="1800" dirty="0" err="1">
-                <a:solidFill>
-                  <a:srgbClr val="002060"/>
-                </a:solidFill>
-                <a:latin typeface="Myriad "/>
-              </a:rPr>
-              <a:t>we</a:t>
-            </a:r>
-            <a:r>
-              <a:rPr lang="hu-HU" sz="1800" dirty="0">
-                <a:solidFill>
-                  <a:srgbClr val="002060"/>
-                </a:solidFill>
-                <a:latin typeface="Myriad "/>
-              </a:rPr>
-              <a:t> </a:t>
-            </a:r>
-            <a:r>
-              <a:rPr lang="hu-HU" sz="1800" dirty="0" err="1">
-                <a:solidFill>
-                  <a:srgbClr val="002060"/>
-                </a:solidFill>
-                <a:latin typeface="Myriad "/>
-              </a:rPr>
-              <a:t>could</a:t>
-            </a:r>
-            <a:r>
-              <a:rPr lang="hu-HU" sz="1800" dirty="0">
-                <a:solidFill>
-                  <a:srgbClr val="002060"/>
-                </a:solidFill>
-                <a:latin typeface="Myriad "/>
-              </a:rPr>
-              <a:t> </a:t>
-            </a:r>
-            <a:r>
-              <a:rPr lang="hu-HU" sz="1800" dirty="0" err="1">
-                <a:solidFill>
-                  <a:srgbClr val="002060"/>
-                </a:solidFill>
-                <a:latin typeface="Myriad "/>
-              </a:rPr>
-              <a:t>provide</a:t>
-            </a:r>
-            <a:r>
-              <a:rPr lang="hu-HU" sz="1800" dirty="0">
-                <a:solidFill>
-                  <a:srgbClr val="002060"/>
-                </a:solidFill>
-                <a:latin typeface="Myriad "/>
-              </a:rPr>
-              <a:t> </a:t>
-            </a:r>
-            <a:r>
-              <a:rPr lang="hu-HU" sz="1800" dirty="0" err="1">
-                <a:solidFill>
-                  <a:srgbClr val="002060"/>
-                </a:solidFill>
-                <a:latin typeface="Myriad "/>
-              </a:rPr>
-              <a:t>very</a:t>
-            </a:r>
-            <a:r>
-              <a:rPr lang="hu-HU" sz="1800" dirty="0">
-                <a:solidFill>
-                  <a:srgbClr val="002060"/>
-                </a:solidFill>
-                <a:latin typeface="Myriad "/>
-              </a:rPr>
-              <a:t> consistent </a:t>
-            </a:r>
-            <a:r>
-              <a:rPr lang="hu-HU" sz="1800" dirty="0" err="1">
-                <a:solidFill>
-                  <a:srgbClr val="002060"/>
-                </a:solidFill>
-                <a:latin typeface="Myriad "/>
-              </a:rPr>
-              <a:t>results</a:t>
-            </a:r>
-            <a:r>
-              <a:rPr lang="hu-HU" sz="1800" dirty="0">
-                <a:solidFill>
-                  <a:srgbClr val="002060"/>
-                </a:solidFill>
-                <a:latin typeface="Myriad "/>
-              </a:rPr>
-              <a:t>. </a:t>
-            </a:r>
-            <a:r>
-              <a:rPr lang="hu-HU" sz="1800" dirty="0" err="1">
-                <a:solidFill>
-                  <a:srgbClr val="002060"/>
-                </a:solidFill>
-                <a:latin typeface="Myriad "/>
-              </a:rPr>
-              <a:t>Our</a:t>
-            </a:r>
-            <a:r>
-              <a:rPr lang="hu-HU" sz="1800" dirty="0">
-                <a:solidFill>
-                  <a:srgbClr val="002060"/>
-                </a:solidFill>
-                <a:latin typeface="Myriad "/>
-              </a:rPr>
-              <a:t> </a:t>
-            </a:r>
-            <a:r>
-              <a:rPr lang="hu-HU" sz="1800" dirty="0" err="1">
-                <a:solidFill>
-                  <a:srgbClr val="002060"/>
-                </a:solidFill>
-                <a:latin typeface="Myriad "/>
-              </a:rPr>
-              <a:t>placements</a:t>
-            </a:r>
-            <a:r>
-              <a:rPr lang="hu-HU" sz="1800" dirty="0">
-                <a:solidFill>
-                  <a:srgbClr val="002060"/>
-                </a:solidFill>
-                <a:latin typeface="Myriad "/>
-              </a:rPr>
-              <a:t> </a:t>
-            </a:r>
-            <a:r>
-              <a:rPr lang="hu-HU" sz="1800" dirty="0" err="1">
-                <a:solidFill>
-                  <a:srgbClr val="002060"/>
-                </a:solidFill>
-                <a:latin typeface="Myriad "/>
-              </a:rPr>
-              <a:t>are</a:t>
-            </a:r>
-            <a:r>
-              <a:rPr lang="hu-HU" sz="1800" dirty="0">
-                <a:solidFill>
-                  <a:srgbClr val="002060"/>
-                </a:solidFill>
-                <a:latin typeface="Myriad "/>
-              </a:rPr>
-              <a:t> 2, 4, 2, 4, 4 and </a:t>
-            </a:r>
-            <a:r>
-              <a:rPr lang="hu-HU" sz="1800" dirty="0" err="1">
-                <a:solidFill>
-                  <a:srgbClr val="002060"/>
-                </a:solidFill>
-                <a:latin typeface="Myriad "/>
-              </a:rPr>
-              <a:t>x.</a:t>
+              <a:t>by</a:t>
+            </a:r>
+            <a:r>
+              <a:rPr lang="hu-HU" sz="1800" dirty="0">
+                <a:solidFill>
+                  <a:srgbClr val="002060"/>
+                </a:solidFill>
+                <a:latin typeface="Myriad "/>
+              </a:rPr>
+              <a:t> </a:t>
+            </a:r>
+            <a:r>
+              <a:rPr lang="hu-HU" sz="1800" dirty="0" err="1">
+                <a:solidFill>
+                  <a:srgbClr val="002060"/>
+                </a:solidFill>
+                <a:latin typeface="Myriad "/>
+              </a:rPr>
+              <a:t>calculating</a:t>
+            </a:r>
+            <a:r>
+              <a:rPr lang="hu-HU" sz="1800" dirty="0">
+                <a:solidFill>
+                  <a:srgbClr val="002060"/>
+                </a:solidFill>
+                <a:latin typeface="Myriad "/>
+              </a:rPr>
+              <a:t> </a:t>
+            </a:r>
+            <a:r>
+              <a:rPr lang="hu-HU" sz="1800" dirty="0" err="1">
+                <a:solidFill>
+                  <a:srgbClr val="002060"/>
+                </a:solidFill>
+                <a:latin typeface="Myriad "/>
+              </a:rPr>
+              <a:t>the</a:t>
+            </a:r>
+            <a:r>
+              <a:rPr lang="hu-HU" sz="1800" dirty="0">
+                <a:solidFill>
+                  <a:srgbClr val="002060"/>
+                </a:solidFill>
+                <a:latin typeface="Myriad "/>
+              </a:rPr>
+              <a:t> MAPE of </a:t>
+            </a:r>
+            <a:r>
+              <a:rPr lang="hu-HU" sz="1800" dirty="0" err="1">
+                <a:solidFill>
+                  <a:srgbClr val="002060"/>
+                </a:solidFill>
+                <a:latin typeface="Myriad "/>
+              </a:rPr>
+              <a:t>the</a:t>
+            </a:r>
+            <a:r>
+              <a:rPr lang="hu-HU" sz="1800" dirty="0">
+                <a:solidFill>
+                  <a:srgbClr val="002060"/>
+                </a:solidFill>
+                <a:latin typeface="Myriad "/>
+              </a:rPr>
+              <a:t> </a:t>
+            </a:r>
+            <a:r>
+              <a:rPr lang="hu-HU" sz="1800" dirty="0" err="1">
+                <a:solidFill>
+                  <a:srgbClr val="002060"/>
+                </a:solidFill>
+                <a:latin typeface="Myriad "/>
+              </a:rPr>
+              <a:t>one-step</a:t>
+            </a:r>
+            <a:r>
+              <a:rPr lang="hu-HU" sz="1800" dirty="0">
+                <a:solidFill>
+                  <a:srgbClr val="002060"/>
+                </a:solidFill>
+                <a:latin typeface="Myriad "/>
+              </a:rPr>
+              <a:t> </a:t>
+            </a:r>
+            <a:r>
+              <a:rPr lang="hu-HU" sz="1800" dirty="0" err="1">
+                <a:solidFill>
+                  <a:srgbClr val="002060"/>
+                </a:solidFill>
+                <a:latin typeface="Myriad "/>
+              </a:rPr>
+              <a:t>ahead</a:t>
+            </a:r>
+            <a:r>
+              <a:rPr lang="hu-HU" sz="1800" dirty="0">
+                <a:solidFill>
+                  <a:srgbClr val="002060"/>
+                </a:solidFill>
+                <a:latin typeface="Myriad "/>
+              </a:rPr>
+              <a:t> </a:t>
+            </a:r>
+            <a:r>
+              <a:rPr lang="hu-HU" sz="1800" dirty="0" err="1">
+                <a:solidFill>
+                  <a:srgbClr val="002060"/>
+                </a:solidFill>
+                <a:latin typeface="Myriad "/>
+              </a:rPr>
+              <a:t>predicitons</a:t>
             </a:r>
             <a:endParaRPr lang="hu-HU" sz="1800" dirty="0">
               <a:solidFill>
@@ -9476,211 +9441,76 @@
           <a:p>
             <a:pPr algn="just"/>
             <a:r>
-              <a:rPr lang="hu-HU" sz="1800" dirty="0" err="1">
-                <a:solidFill>
-                  <a:srgbClr val="002060"/>
-                </a:solidFill>
-                <a:latin typeface="Myriad "/>
-              </a:rPr>
-              <a:t>We</a:t>
-            </a:r>
-            <a:r>
-              <a:rPr lang="hu-HU" sz="1800" dirty="0">
-                <a:solidFill>
-                  <a:srgbClr val="002060"/>
-                </a:solidFill>
-                <a:latin typeface="Myriad "/>
-              </a:rPr>
-              <a:t> </a:t>
-            </a:r>
-            <a:r>
-              <a:rPr lang="hu-HU" sz="1800" dirty="0" err="1">
-                <a:solidFill>
-                  <a:srgbClr val="002060"/>
-                </a:solidFill>
-                <a:latin typeface="Myriad "/>
-              </a:rPr>
-              <a:t>plan</a:t>
-            </a:r>
-            <a:r>
-              <a:rPr lang="hu-HU" sz="1800" dirty="0">
-                <a:solidFill>
-                  <a:srgbClr val="002060"/>
-                </a:solidFill>
-                <a:latin typeface="Myriad "/>
-              </a:rPr>
-              <a:t> </a:t>
-            </a:r>
-            <a:r>
-              <a:rPr lang="hu-HU" sz="1800" dirty="0" err="1">
-                <a:solidFill>
-                  <a:srgbClr val="002060"/>
-                </a:solidFill>
-                <a:latin typeface="Myriad "/>
-              </a:rPr>
-              <a:t>to</a:t>
-            </a:r>
-            <a:r>
-              <a:rPr lang="hu-HU" sz="1800" dirty="0">
-                <a:solidFill>
-                  <a:srgbClr val="002060"/>
-                </a:solidFill>
-                <a:latin typeface="Myriad "/>
-              </a:rPr>
-              <a:t> </a:t>
-            </a:r>
-            <a:r>
-              <a:rPr lang="hu-HU" sz="1800" dirty="0" err="1">
-                <a:solidFill>
-                  <a:srgbClr val="002060"/>
-                </a:solidFill>
-                <a:latin typeface="Myriad "/>
-              </a:rPr>
-              <a:t>generalize</a:t>
-            </a:r>
-            <a:r>
-              <a:rPr lang="hu-HU" sz="1800" dirty="0">
-                <a:solidFill>
-                  <a:srgbClr val="002060"/>
-                </a:solidFill>
-                <a:latin typeface="Myriad "/>
-              </a:rPr>
-              <a:t> </a:t>
-            </a:r>
-            <a:r>
-              <a:rPr lang="hu-HU" sz="1800" dirty="0" err="1">
-                <a:solidFill>
-                  <a:srgbClr val="002060"/>
-                </a:solidFill>
-                <a:latin typeface="Myriad "/>
-              </a:rPr>
-              <a:t>further</a:t>
-            </a:r>
-            <a:r>
-              <a:rPr lang="hu-HU" sz="1800" dirty="0">
-                <a:solidFill>
-                  <a:srgbClr val="002060"/>
-                </a:solidFill>
-                <a:latin typeface="Myriad "/>
-              </a:rPr>
-              <a:t> </a:t>
-            </a:r>
-            <a:r>
-              <a:rPr lang="hu-HU" sz="1800" dirty="0" err="1">
-                <a:solidFill>
-                  <a:srgbClr val="002060"/>
-                </a:solidFill>
-                <a:latin typeface="Myriad "/>
-              </a:rPr>
-              <a:t>the</a:t>
-            </a:r>
-            <a:r>
-              <a:rPr lang="hu-HU" sz="1800" dirty="0">
-                <a:solidFill>
-                  <a:srgbClr val="002060"/>
-                </a:solidFill>
-                <a:latin typeface="Myriad "/>
-              </a:rPr>
-              <a:t> </a:t>
-            </a:r>
-            <a:r>
-              <a:rPr lang="hu-HU" sz="1800" dirty="0" err="1">
-                <a:solidFill>
-                  <a:srgbClr val="002060"/>
-                </a:solidFill>
-                <a:latin typeface="Myriad "/>
-              </a:rPr>
-              <a:t>method</a:t>
-            </a:r>
-            <a:r>
-              <a:rPr lang="hu-HU" sz="1800" dirty="0">
-                <a:solidFill>
-                  <a:srgbClr val="002060"/>
-                </a:solidFill>
-                <a:latin typeface="Myriad "/>
-              </a:rPr>
-              <a:t> </a:t>
-            </a:r>
-            <a:r>
-              <a:rPr lang="hu-HU" sz="1800" dirty="0" err="1">
-                <a:solidFill>
-                  <a:srgbClr val="002060"/>
-                </a:solidFill>
-                <a:latin typeface="Myriad "/>
-              </a:rPr>
-              <a:t>to</a:t>
-            </a:r>
-            <a:r>
-              <a:rPr lang="hu-HU" sz="1800" dirty="0">
-                <a:solidFill>
-                  <a:srgbClr val="002060"/>
-                </a:solidFill>
-                <a:latin typeface="Myriad "/>
-              </a:rPr>
-              <a:t> </a:t>
-            </a:r>
-            <a:r>
-              <a:rPr lang="hu-HU" sz="1800" dirty="0" err="1">
-                <a:solidFill>
-                  <a:srgbClr val="002060"/>
-                </a:solidFill>
-                <a:latin typeface="Myriad "/>
-              </a:rPr>
-              <a:t>become</a:t>
-            </a:r>
-            <a:r>
-              <a:rPr lang="hu-HU" sz="1800" dirty="0">
-                <a:solidFill>
-                  <a:srgbClr val="002060"/>
-                </a:solidFill>
-                <a:latin typeface="Myriad "/>
-              </a:rPr>
-              <a:t> a </a:t>
-            </a:r>
-            <a:r>
-              <a:rPr lang="hu-HU" sz="1800" dirty="0" err="1">
-                <a:solidFill>
-                  <a:srgbClr val="002060"/>
-                </a:solidFill>
-                <a:latin typeface="Myriad "/>
-              </a:rPr>
-              <a:t>time</a:t>
-            </a:r>
-            <a:r>
-              <a:rPr lang="hu-HU" sz="1800" dirty="0">
-                <a:solidFill>
-                  <a:srgbClr val="002060"/>
-                </a:solidFill>
-                <a:latin typeface="Myriad "/>
-              </a:rPr>
-              <a:t> </a:t>
-            </a:r>
-            <a:r>
-              <a:rPr lang="hu-HU" sz="1800" dirty="0" err="1">
-                <a:solidFill>
-                  <a:srgbClr val="002060"/>
-                </a:solidFill>
-                <a:latin typeface="Myriad "/>
-              </a:rPr>
-              <a:t>series</a:t>
-            </a:r>
-            <a:r>
-              <a:rPr lang="hu-HU" sz="1800" dirty="0">
-                <a:solidFill>
-                  <a:srgbClr val="002060"/>
-                </a:solidFill>
-                <a:latin typeface="Myriad "/>
-              </a:rPr>
-              <a:t> nowcasting </a:t>
-            </a:r>
-            <a:r>
-              <a:rPr lang="hu-HU" sz="1800" dirty="0" err="1">
-                <a:solidFill>
-                  <a:srgbClr val="002060"/>
-                </a:solidFill>
-                <a:latin typeface="Myriad "/>
-              </a:rPr>
-              <a:t>tool</a:t>
+              <a:rPr lang="hu-HU" sz="1800" dirty="0">
+                <a:solidFill>
+                  <a:srgbClr val="002060"/>
+                </a:solidFill>
+                <a:latin typeface="Myriad "/>
+              </a:rPr>
+              <a:t>The 3 and 5 </a:t>
+            </a:r>
+            <a:r>
+              <a:rPr lang="hu-HU" sz="1800" dirty="0" err="1">
+                <a:solidFill>
+                  <a:srgbClr val="002060"/>
+                </a:solidFill>
+                <a:latin typeface="Myriad "/>
+              </a:rPr>
+              <a:t>best</a:t>
+            </a:r>
+            <a:r>
+              <a:rPr lang="hu-HU" sz="1800" dirty="0">
+                <a:solidFill>
+                  <a:srgbClr val="002060"/>
+                </a:solidFill>
+                <a:latin typeface="Myriad "/>
+              </a:rPr>
+              <a:t> </a:t>
+            </a:r>
+            <a:r>
+              <a:rPr lang="hu-HU" sz="1800" dirty="0" err="1">
+                <a:solidFill>
+                  <a:srgbClr val="002060"/>
+                </a:solidFill>
+                <a:latin typeface="Myriad "/>
+              </a:rPr>
+              <a:t>models</a:t>
+            </a:r>
+            <a:r>
+              <a:rPr lang="hu-HU" sz="1800" dirty="0">
+                <a:solidFill>
+                  <a:srgbClr val="002060"/>
+                </a:solidFill>
+                <a:latin typeface="Myriad "/>
+              </a:rPr>
+              <a:t> </a:t>
+            </a:r>
+            <a:r>
+              <a:rPr lang="hu-HU" sz="1800" dirty="0" err="1">
+                <a:solidFill>
+                  <a:srgbClr val="002060"/>
+                </a:solidFill>
+                <a:latin typeface="Myriad "/>
+              </a:rPr>
+              <a:t>then</a:t>
+            </a:r>
+            <a:r>
+              <a:rPr lang="hu-HU" sz="1800" dirty="0">
+                <a:solidFill>
+                  <a:srgbClr val="002060"/>
+                </a:solidFill>
+                <a:latin typeface="Myriad "/>
+              </a:rPr>
+              <a:t> </a:t>
+            </a:r>
+            <a:r>
+              <a:rPr lang="hu-HU" sz="1800" dirty="0" err="1">
+                <a:solidFill>
+                  <a:srgbClr val="002060"/>
+                </a:solidFill>
+                <a:latin typeface="Myriad "/>
+              </a:rPr>
+              <a:t>averaged</a:t>
             </a:r>
             <a:r>
               <a:rPr lang="hu-HU" sz="1800" dirty="0">
@@ -9707,43 +9537,124 @@
                 </a:solidFill>
                 <a:latin typeface="Myriad "/>
               </a:rPr>
-              <a:t> </a:t>
-            </a:r>
-            <a:r>
-              <a:rPr lang="hu-HU" sz="1800" dirty="0" err="1">
-                <a:solidFill>
-                  <a:srgbClr val="002060"/>
-                </a:solidFill>
-                <a:latin typeface="Myriad "/>
-              </a:rPr>
-              <a:t>general</a:t>
-            </a:r>
-            <a:r>
-              <a:rPr lang="hu-HU" sz="1800" dirty="0">
-                <a:solidFill>
-                  <a:srgbClr val="002060"/>
-                </a:solidFill>
-                <a:latin typeface="Myriad "/>
-              </a:rPr>
-              <a:t> </a:t>
-            </a:r>
-            <a:r>
-              <a:rPr lang="hu-HU" sz="1800" dirty="0" err="1">
-                <a:solidFill>
-                  <a:srgbClr val="002060"/>
-                </a:solidFill>
-                <a:latin typeface="Myriad "/>
-              </a:rPr>
-              <a:t>purpose</a:t>
-            </a:r>
-            <a:r>
-              <a:rPr lang="hu-HU" sz="1800" dirty="0">
-                <a:solidFill>
-                  <a:srgbClr val="002060"/>
-                </a:solidFill>
-                <a:latin typeface="Myriad "/>
-              </a:rPr>
-              <a:t>.</a:t>
+              <a:t> an </a:t>
+            </a:r>
+            <a:r>
+              <a:rPr lang="hu-HU" sz="1800" dirty="0" err="1">
+                <a:solidFill>
+                  <a:srgbClr val="002060"/>
+                </a:solidFill>
+                <a:latin typeface="Myriad "/>
+              </a:rPr>
+              <a:t>ensemble</a:t>
+            </a:r>
+            <a:r>
+              <a:rPr lang="hu-HU" sz="1800" dirty="0">
+                <a:solidFill>
+                  <a:srgbClr val="002060"/>
+                </a:solidFill>
+                <a:latin typeface="Myriad "/>
+              </a:rPr>
+              <a:t> </a:t>
+            </a:r>
+            <a:r>
+              <a:rPr lang="hu-HU" sz="1800" dirty="0" err="1">
+                <a:solidFill>
+                  <a:srgbClr val="002060"/>
+                </a:solidFill>
+                <a:latin typeface="Myriad "/>
+              </a:rPr>
+              <a:t>predictor</a:t>
+            </a:r>
+            <a:endParaRPr lang="hu-HU" sz="1800" dirty="0">
+              <a:solidFill>
+                <a:srgbClr val="002060"/>
+              </a:solidFill>
+              <a:latin typeface="Myriad "/>
+            </a:endParaRPr>
+          </a:p>
+          <a:p>
+            <a:pPr algn="just"/>
+            <a:r>
+              <a:rPr lang="hu-HU" sz="1800" dirty="0">
+                <a:solidFill>
+                  <a:srgbClr val="002060"/>
+                </a:solidFill>
+                <a:latin typeface="Myriad "/>
+              </a:rPr>
+              <a:t>The </a:t>
+            </a:r>
+            <a:r>
+              <a:rPr lang="hu-HU" sz="1800" dirty="0" err="1">
+                <a:solidFill>
+                  <a:srgbClr val="002060"/>
+                </a:solidFill>
+                <a:latin typeface="Myriad "/>
+              </a:rPr>
+              <a:t>Errors</a:t>
+            </a:r>
+            <a:r>
+              <a:rPr lang="hu-HU" sz="1800" dirty="0">
+                <a:solidFill>
+                  <a:srgbClr val="002060"/>
+                </a:solidFill>
+                <a:latin typeface="Myriad "/>
+              </a:rPr>
+              <a:t> of </a:t>
+            </a:r>
+            <a:r>
+              <a:rPr lang="hu-HU" sz="1800" dirty="0" err="1">
+                <a:solidFill>
+                  <a:srgbClr val="002060"/>
+                </a:solidFill>
+                <a:latin typeface="Myriad "/>
+              </a:rPr>
+              <a:t>our</a:t>
+            </a:r>
+            <a:r>
+              <a:rPr lang="hu-HU" sz="1800" dirty="0">
+                <a:solidFill>
+                  <a:srgbClr val="002060"/>
+                </a:solidFill>
+                <a:latin typeface="Myriad "/>
+              </a:rPr>
+              <a:t> </a:t>
+            </a:r>
+            <a:r>
+              <a:rPr lang="hu-HU" sz="1800" dirty="0" err="1">
+                <a:solidFill>
+                  <a:srgbClr val="002060"/>
+                </a:solidFill>
+                <a:latin typeface="Myriad "/>
+              </a:rPr>
+              <a:t>nowcasted</a:t>
+            </a:r>
+            <a:r>
+              <a:rPr lang="hu-HU" sz="1800" dirty="0">
+                <a:solidFill>
+                  <a:srgbClr val="002060"/>
+                </a:solidFill>
+                <a:latin typeface="Myriad "/>
+              </a:rPr>
+              <a:t> </a:t>
+            </a:r>
+            <a:r>
+              <a:rPr lang="hu-HU" sz="1800" dirty="0" err="1">
+                <a:solidFill>
+                  <a:srgbClr val="002060"/>
+                </a:solidFill>
+                <a:latin typeface="Myriad "/>
+              </a:rPr>
+              <a:t>values</a:t>
+            </a:r>
+            <a:r>
+              <a:rPr lang="hu-HU" sz="1800" dirty="0">
+                <a:solidFill>
+                  <a:srgbClr val="002060"/>
+                </a:solidFill>
+                <a:latin typeface="Myriad "/>
+              </a:rPr>
+              <a:t>:</a:t>
             </a:r>
           </a:p>
           <a:p>
@@ -9755,16 +9666,16 @@
                 </a:solidFill>
                 <a:latin typeface="Myriad "/>
               </a:rPr>
-              <a:t>Also</a:t>
-            </a:r>
-            <a:r>
-              <a:rPr lang="hu-HU" sz="1400">
-                <a:solidFill>
-                  <a:srgbClr val="002060"/>
-                </a:solidFill>
-                <a:latin typeface="Myriad "/>
-              </a:rPr>
-              <a:t>, </a:t>
+              <a:t>Average</a:t>
+            </a:r>
+            <a:r>
+              <a:rPr lang="hu-HU" sz="1400" dirty="0">
+                <a:solidFill>
+                  <a:srgbClr val="002060"/>
+                </a:solidFill>
+                <a:latin typeface="Myriad "/>
+              </a:rPr>
+              <a:t> </a:t>
             </a:r>
             <a:r>
               <a:rPr lang="hu-HU" sz="1400" dirty="0" err="1">
@@ -9773,7 +9684,7 @@
                 </a:solidFill>
                 <a:latin typeface="Myriad "/>
               </a:rPr>
-              <a:t>thinking</a:t>
+              <a:t>value</a:t>
             </a:r>
             <a:r>
               <a:rPr lang="hu-HU" sz="1400" dirty="0">
@@ -9782,7 +9693,7 @@
                 </a:solidFill>
                 <a:latin typeface="Myriad "/>
               </a:rPr>
-              <a:t> </a:t>
+              <a:t> of </a:t>
             </a:r>
             <a:r>
               <a:rPr lang="hu-HU" sz="1400" dirty="0" err="1">
@@ -9791,7 +9702,7 @@
                 </a:solidFill>
                 <a:latin typeface="Myriad "/>
               </a:rPr>
-              <a:t>on</a:t>
+              <a:t>indices</a:t>
             </a:r>
             <a:r>
               <a:rPr lang="hu-HU" sz="1400" dirty="0">
@@ -9800,8 +9711,11 @@
                 </a:solidFill>
                 <a:latin typeface="Myriad "/>
               </a:rPr>
-              <a:t> a web </a:t>
-            </a:r>
+              <a:t>: 165.2</a:t>
+            </a:r>
+          </a:p>
+          <a:p>
+            <a:pPr lvl="1" algn="just"/>
             <a:r>
               <a:rPr lang="hu-HU" sz="1400" dirty="0" err="1">
                 <a:solidFill>
@@ -9809,7 +9723,7 @@
                 </a:solidFill>
                 <a:latin typeface="Myriad "/>
               </a:rPr>
-              <a:t>application</a:t>
+              <a:t>Average</a:t>
             </a:r>
             <a:r>
               <a:rPr lang="hu-HU" sz="1400" dirty="0">
@@ -9818,7 +9732,7 @@
                 </a:solidFill>
                 <a:latin typeface="Myriad "/>
               </a:rPr>
-              <a:t> </a:t>
+              <a:t> RMSE of </a:t>
             </a:r>
             <a:r>
               <a:rPr lang="hu-HU" sz="1400" dirty="0" err="1">
@@ -9827,7 +9741,7 @@
                 </a:solidFill>
                 <a:latin typeface="Myriad "/>
               </a:rPr>
-              <a:t>that</a:t>
+              <a:t>all</a:t>
             </a:r>
             <a:r>
               <a:rPr lang="hu-HU" sz="1400" dirty="0">
@@ -9836,7 +9750,7 @@
                 </a:solidFill>
                 <a:latin typeface="Myriad "/>
               </a:rPr>
-              <a:t> </a:t>
+              <a:t> 5 </a:t>
             </a:r>
             <a:r>
               <a:rPr lang="hu-HU" sz="1400" dirty="0" err="1">
@@ -9845,7 +9759,7 @@
                 </a:solidFill>
                 <a:latin typeface="Myriad "/>
               </a:rPr>
-              <a:t>could</a:t>
+              <a:t>entries</a:t>
             </a:r>
             <a:r>
               <a:rPr lang="hu-HU" sz="1400" dirty="0">
@@ -9854,8 +9768,11 @@
                 </a:solidFill>
                 <a:latin typeface="Myriad "/>
               </a:rPr>
-              <a:t> </a:t>
-            </a:r>
+              <a:t>: 13.9 (8.4%)</a:t>
+            </a:r>
+          </a:p>
+          <a:p>
+            <a:pPr lvl="1" algn="just"/>
             <a:r>
               <a:rPr lang="hu-HU" sz="1400" dirty="0" err="1">
                 <a:solidFill>
@@ -9863,7 +9780,7 @@
                 </a:solidFill>
                 <a:latin typeface="Myriad "/>
               </a:rPr>
-              <a:t>help</a:t>
+              <a:t>Weighted</a:t>
             </a:r>
             <a:r>
               <a:rPr lang="hu-HU" sz="1400" dirty="0">
@@ -9872,7 +9789,7 @@
                 </a:solidFill>
                 <a:latin typeface="Myriad "/>
               </a:rPr>
-              <a:t> in </a:t>
+              <a:t> </a:t>
             </a:r>
             <a:r>
               <a:rPr lang="hu-HU" sz="1400" dirty="0" err="1">
@@ -9881,7 +9798,7 @@
                 </a:solidFill>
                 <a:latin typeface="Myriad "/>
               </a:rPr>
-              <a:t>providing</a:t>
+              <a:t>Average</a:t>
             </a:r>
             <a:r>
               <a:rPr lang="hu-HU" sz="1400" dirty="0">
@@ -9890,8 +9807,11 @@
                 </a:solidFill>
                 <a:latin typeface="Myriad "/>
               </a:rPr>
-              <a:t> </a:t>
-            </a:r>
+              <a:t> RMSE: 14.9 (9%)</a:t>
+            </a:r>
+          </a:p>
+          <a:p>
+            <a:pPr lvl="1" algn="just"/>
             <a:r>
               <a:rPr lang="hu-HU" sz="1400" dirty="0" err="1">
                 <a:solidFill>
@@ -9899,7 +9819,7 @@
                 </a:solidFill>
                 <a:latin typeface="Myriad "/>
               </a:rPr>
-              <a:t>estimates</a:t>
+              <a:t>Average</a:t>
             </a:r>
             <a:r>
               <a:rPr lang="hu-HU" sz="1400" dirty="0">
@@ -9908,89 +9828,154 @@
                 </a:solidFill>
                 <a:latin typeface="Myriad "/>
               </a:rPr>
-              <a:t>.</a:t>
-            </a:r>
-          </a:p>
-          <a:p>
-            <a:pPr algn="just"/>
-            <a:r>
-              <a:rPr lang="hu-HU" sz="1800" dirty="0" err="1">
-                <a:solidFill>
-                  <a:srgbClr val="002060"/>
-                </a:solidFill>
-                <a:latin typeface="Myriad "/>
-              </a:rPr>
-              <a:t>Any</a:t>
-            </a:r>
-            <a:r>
-              <a:rPr lang="hu-HU" sz="1800" dirty="0">
-                <a:solidFill>
-                  <a:srgbClr val="002060"/>
-                </a:solidFill>
-                <a:latin typeface="Myriad "/>
-              </a:rPr>
-              <a:t> </a:t>
-            </a:r>
-            <a:r>
-              <a:rPr lang="hu-HU" sz="1800" dirty="0" err="1">
-                <a:solidFill>
-                  <a:srgbClr val="002060"/>
-                </a:solidFill>
-                <a:latin typeface="Myriad "/>
-              </a:rPr>
-              <a:t>suggestions</a:t>
-            </a:r>
-            <a:r>
-              <a:rPr lang="hu-HU" sz="1800" dirty="0">
-                <a:solidFill>
-                  <a:srgbClr val="002060"/>
-                </a:solidFill>
-                <a:latin typeface="Myriad "/>
-              </a:rPr>
-              <a:t> </a:t>
-            </a:r>
-            <a:r>
-              <a:rPr lang="hu-HU" sz="1800" dirty="0" err="1">
-                <a:solidFill>
-                  <a:srgbClr val="002060"/>
-                </a:solidFill>
-                <a:latin typeface="Myriad "/>
-              </a:rPr>
-              <a:t>are</a:t>
-            </a:r>
-            <a:r>
-              <a:rPr lang="hu-HU" sz="1800" dirty="0">
-                <a:solidFill>
-                  <a:srgbClr val="002060"/>
-                </a:solidFill>
-                <a:latin typeface="Myriad "/>
-              </a:rPr>
-              <a:t> </a:t>
-            </a:r>
-            <a:r>
-              <a:rPr lang="hu-HU" sz="1800" dirty="0" err="1">
-                <a:solidFill>
-                  <a:srgbClr val="002060"/>
-                </a:solidFill>
-                <a:latin typeface="Myriad "/>
-              </a:rPr>
-              <a:t>welcome</a:t>
-            </a:r>
-            <a:r>
-              <a:rPr lang="hu-HU" sz="1800" dirty="0">
-                <a:solidFill>
-                  <a:srgbClr val="002060"/>
-                </a:solidFill>
-                <a:latin typeface="Myriad "/>
-              </a:rPr>
-              <a:t>!</a:t>
-            </a:r>
-          </a:p>
-          <a:p>
-            <a:pPr marL="0" indent="0" algn="just">
-              <a:buNone/>
-            </a:pPr>
-            <a:endParaRPr lang="hu-HU" sz="1800" dirty="0">
+              <a:t> MSRE of </a:t>
+            </a:r>
+            <a:r>
+              <a:rPr lang="hu-HU" sz="1400" dirty="0" err="1">
+                <a:solidFill>
+                  <a:srgbClr val="002060"/>
+                </a:solidFill>
+                <a:latin typeface="Myriad "/>
+              </a:rPr>
+              <a:t>all</a:t>
+            </a:r>
+            <a:r>
+              <a:rPr lang="hu-HU" sz="1400" dirty="0">
+                <a:solidFill>
+                  <a:srgbClr val="002060"/>
+                </a:solidFill>
+                <a:latin typeface="Myriad "/>
+              </a:rPr>
+              <a:t> 5 </a:t>
+            </a:r>
+            <a:r>
+              <a:rPr lang="hu-HU" sz="1400" dirty="0" err="1">
+                <a:solidFill>
+                  <a:srgbClr val="002060"/>
+                </a:solidFill>
+                <a:latin typeface="Myriad "/>
+              </a:rPr>
+              <a:t>entries</a:t>
+            </a:r>
+            <a:r>
+              <a:rPr lang="hu-HU" sz="1400" dirty="0">
+                <a:solidFill>
+                  <a:srgbClr val="002060"/>
+                </a:solidFill>
+                <a:latin typeface="Myriad "/>
+              </a:rPr>
+              <a:t>: 0.078</a:t>
+            </a:r>
+          </a:p>
+          <a:p>
+            <a:pPr lvl="1" algn="just"/>
+            <a:r>
+              <a:rPr lang="hu-HU" sz="1400" dirty="0" err="1">
+                <a:solidFill>
+                  <a:srgbClr val="002060"/>
+                </a:solidFill>
+                <a:latin typeface="Myriad "/>
+              </a:rPr>
+              <a:t>Weighted</a:t>
+            </a:r>
+            <a:r>
+              <a:rPr lang="hu-HU" sz="1400" dirty="0">
+                <a:solidFill>
+                  <a:srgbClr val="002060"/>
+                </a:solidFill>
+                <a:latin typeface="Myriad "/>
+              </a:rPr>
+              <a:t> </a:t>
+            </a:r>
+            <a:r>
+              <a:rPr lang="hu-HU" sz="1400" dirty="0" err="1">
+                <a:solidFill>
+                  <a:srgbClr val="002060"/>
+                </a:solidFill>
+                <a:latin typeface="Myriad "/>
+              </a:rPr>
+              <a:t>Average</a:t>
+            </a:r>
+            <a:r>
+              <a:rPr lang="hu-HU" sz="1400" dirty="0">
+                <a:solidFill>
+                  <a:srgbClr val="002060"/>
+                </a:solidFill>
+                <a:latin typeface="Myriad "/>
+              </a:rPr>
+              <a:t> MSRE: 0.084</a:t>
+            </a:r>
+          </a:p>
+          <a:p>
+            <a:pPr lvl="1" algn="just"/>
+            <a:r>
+              <a:rPr lang="hu-HU" sz="1400" dirty="0">
+                <a:solidFill>
+                  <a:srgbClr val="002060"/>
+                </a:solidFill>
+                <a:latin typeface="Myriad "/>
+              </a:rPr>
+              <a:t>The </a:t>
+            </a:r>
+            <a:r>
+              <a:rPr lang="hu-HU" sz="1400" dirty="0" err="1">
+                <a:solidFill>
+                  <a:srgbClr val="002060"/>
+                </a:solidFill>
+                <a:latin typeface="Myriad "/>
+              </a:rPr>
+              <a:t>best</a:t>
+            </a:r>
+            <a:r>
+              <a:rPr lang="hu-HU" sz="1400" dirty="0">
+                <a:solidFill>
+                  <a:srgbClr val="002060"/>
+                </a:solidFill>
+                <a:latin typeface="Myriad "/>
+              </a:rPr>
+              <a:t> 5 </a:t>
+            </a:r>
+            <a:r>
+              <a:rPr lang="hu-HU" sz="1400" dirty="0" err="1">
+                <a:solidFill>
+                  <a:srgbClr val="002060"/>
+                </a:solidFill>
+                <a:latin typeface="Myriad "/>
+              </a:rPr>
+              <a:t>predictions</a:t>
+            </a:r>
+            <a:r>
+              <a:rPr lang="hu-HU" sz="1400" dirty="0">
+                <a:solidFill>
+                  <a:srgbClr val="002060"/>
+                </a:solidFill>
+                <a:latin typeface="Myriad "/>
+              </a:rPr>
+              <a:t>’ </a:t>
+            </a:r>
+            <a:r>
+              <a:rPr lang="hu-HU" sz="1400" dirty="0" err="1">
+                <a:solidFill>
+                  <a:srgbClr val="002060"/>
+                </a:solidFill>
+                <a:latin typeface="Myriad "/>
+              </a:rPr>
+              <a:t>average</a:t>
+            </a:r>
+            <a:r>
+              <a:rPr lang="hu-HU" sz="1400" dirty="0">
+                <a:solidFill>
+                  <a:srgbClr val="002060"/>
+                </a:solidFill>
+                <a:latin typeface="Myriad "/>
+              </a:rPr>
+              <a:t> MSRE: 0.000054</a:t>
+            </a:r>
+            <a:r>
+              <a:rPr lang="hu-HU" sz="900" dirty="0"/>
+              <a:t> </a:t>
+            </a:r>
+            <a:endParaRPr lang="hu-HU" sz="1400" dirty="0">
               <a:solidFill>
                 <a:srgbClr val="002060"/>
               </a:solidFill>
@@ -10023,6 +10008,1505 @@
             <a:fld id="{80DEC6E1-F1C1-444D-8DA3-0621314F7DF1}" type="slidenum">
               <a:rPr lang="hu-HU" smtClean="0"/>
               <a:t>14</a:t>
+            </a:fld>
+            <a:endParaRPr lang="hu-HU"/>
+          </a:p>
+        </p:txBody>
+      </p:sp>
+      <p:sp>
+        <p:nvSpPr>
+          <p:cNvPr id="5" name="Szövegdoboz 4">
+            <a:extLst>
+              <a:ext uri="{FF2B5EF4-FFF2-40B4-BE49-F238E27FC236}">
+                <a16:creationId xmlns:a16="http://schemas.microsoft.com/office/drawing/2014/main" id="{2A8193D1-F427-4BC6-BB92-32AFE71D746C}"/>
+              </a:ext>
+            </a:extLst>
+          </p:cNvPr>
+          <p:cNvSpPr txBox="1"/>
+          <p:nvPr/>
+        </p:nvSpPr>
+        <p:spPr>
+          <a:xfrm>
+            <a:off x="561560" y="243715"/>
+            <a:ext cx="10591800" cy="646331"/>
+          </a:xfrm>
+          <a:prstGeom prst="rect">
+            <a:avLst/>
+          </a:prstGeom>
+          <a:noFill/>
+        </p:spPr>
+        <p:txBody>
+          <a:bodyPr wrap="square" rtlCol="0">
+            <a:spAutoFit/>
+          </a:bodyPr>
+          <a:lstStyle/>
+          <a:p>
+            <a:pPr algn="ctr"/>
+            <a:r>
+              <a:rPr lang="hu-HU" sz="3600" b="1" dirty="0">
+                <a:solidFill>
+                  <a:srgbClr val="002060"/>
+                </a:solidFill>
+                <a:latin typeface="Myriad "/>
+              </a:rPr>
+              <a:t>The </a:t>
+            </a:r>
+            <a:r>
+              <a:rPr lang="hu-HU" sz="3600" b="1" dirty="0" err="1">
+                <a:solidFill>
+                  <a:srgbClr val="002060"/>
+                </a:solidFill>
+                <a:latin typeface="Myriad "/>
+              </a:rPr>
+              <a:t>method</a:t>
+            </a:r>
+            <a:r>
+              <a:rPr lang="hu-HU" sz="3600" b="1" dirty="0">
+                <a:solidFill>
+                  <a:srgbClr val="002060"/>
+                </a:solidFill>
+                <a:latin typeface="Myriad "/>
+              </a:rPr>
+              <a:t>: </a:t>
+            </a:r>
+            <a:r>
+              <a:rPr lang="hu-HU" sz="3600" b="1" dirty="0" err="1">
+                <a:solidFill>
+                  <a:srgbClr val="002060"/>
+                </a:solidFill>
+                <a:latin typeface="Myriad "/>
+              </a:rPr>
+              <a:t>Results</a:t>
+            </a:r>
+            <a:endParaRPr lang="hu-HU" sz="3600" b="1" dirty="0">
+              <a:solidFill>
+                <a:srgbClr val="002060"/>
+              </a:solidFill>
+              <a:latin typeface="Myriad "/>
+            </a:endParaRPr>
+          </a:p>
+        </p:txBody>
+      </p:sp>
+      <p:pic>
+        <p:nvPicPr>
+          <p:cNvPr id="7" name="Kép 6">
+            <a:extLst>
+              <a:ext uri="{FF2B5EF4-FFF2-40B4-BE49-F238E27FC236}">
+                <a16:creationId xmlns:a16="http://schemas.microsoft.com/office/drawing/2014/main" id="{0EE811EB-EE5B-4470-966F-044276A99995}"/>
+              </a:ext>
+            </a:extLst>
+          </p:cNvPr>
+          <p:cNvPicPr>
+            <a:picLocks noChangeAspect="1"/>
+          </p:cNvPicPr>
+          <p:nvPr/>
+        </p:nvPicPr>
+        <p:blipFill>
+          <a:blip r:embed="rId2">
+            <a:extLst>
+              <a:ext uri="{28A0092B-C50C-407E-A947-70E740481C1C}">
+                <a14:useLocalDpi xmlns:a14="http://schemas.microsoft.com/office/drawing/2010/main" val="0"/>
+              </a:ext>
+            </a:extLst>
+          </a:blip>
+          <a:stretch>
+            <a:fillRect/>
+          </a:stretch>
+        </p:blipFill>
+        <p:spPr>
+          <a:xfrm>
+            <a:off x="6673800" y="1245367"/>
+            <a:ext cx="4680000" cy="2449187"/>
+          </a:xfrm>
+          <a:prstGeom prst="rect">
+            <a:avLst/>
+          </a:prstGeom>
+        </p:spPr>
+      </p:pic>
+      <p:pic>
+        <p:nvPicPr>
+          <p:cNvPr id="6" name="Kép 5">
+            <a:extLst>
+              <a:ext uri="{FF2B5EF4-FFF2-40B4-BE49-F238E27FC236}">
+                <a16:creationId xmlns:a16="http://schemas.microsoft.com/office/drawing/2014/main" id="{CE67A5DB-3870-4F59-8F43-604C36AB3825}"/>
+              </a:ext>
+            </a:extLst>
+          </p:cNvPr>
+          <p:cNvPicPr>
+            <a:picLocks/>
+          </p:cNvPicPr>
+          <p:nvPr/>
+        </p:nvPicPr>
+        <p:blipFill>
+          <a:blip r:embed="rId3">
+            <a:extLst>
+              <a:ext uri="{28A0092B-C50C-407E-A947-70E740481C1C}">
+                <a14:useLocalDpi xmlns:a14="http://schemas.microsoft.com/office/drawing/2010/main" val="0"/>
+              </a:ext>
+            </a:extLst>
+          </a:blip>
+          <a:stretch>
+            <a:fillRect/>
+          </a:stretch>
+        </p:blipFill>
+        <p:spPr>
+          <a:xfrm>
+            <a:off x="6673800" y="3694554"/>
+            <a:ext cx="4680000" cy="2520000"/>
+          </a:xfrm>
+          <a:prstGeom prst="rect">
+            <a:avLst/>
+          </a:prstGeom>
+        </p:spPr>
+      </p:pic>
+    </p:spTree>
+    <p:extLst>
+      <p:ext uri="{BB962C8B-B14F-4D97-AF65-F5344CB8AC3E}">
+        <p14:creationId xmlns:p14="http://schemas.microsoft.com/office/powerpoint/2010/main" val="2959317589"/>
+      </p:ext>
+    </p:extLst>
+  </p:cSld>
+  <p:clrMapOvr>
+    <a:masterClrMapping/>
+  </p:clrMapOvr>
+</p:sld>
+</file>
+
+<file path=ppt/slides/slide15.xml><?xml version="1.0" encoding="utf-8"?>
+<p:sld xmlns:a="http://schemas.openxmlformats.org/drawingml/2006/main" xmlns:r="http://schemas.openxmlformats.org/officeDocument/2006/relationships" xmlns:p="http://schemas.openxmlformats.org/presentationml/2006/main">
+  <p:cSld>
+    <p:spTree>
+      <p:nvGrpSpPr>
+        <p:cNvPr id="1" name=""/>
+        <p:cNvGrpSpPr/>
+        <p:nvPr/>
+      </p:nvGrpSpPr>
+      <p:grpSpPr>
+        <a:xfrm>
+          <a:off x="0" y="0"/>
+          <a:ext cx="0" cy="0"/>
+          <a:chOff x="0" y="0"/>
+          <a:chExt cx="0" cy="0"/>
+        </a:xfrm>
+      </p:grpSpPr>
+      <p:sp>
+        <p:nvSpPr>
+          <p:cNvPr id="3" name="Tartalom helye 2">
+            <a:extLst>
+              <a:ext uri="{FF2B5EF4-FFF2-40B4-BE49-F238E27FC236}">
+                <a16:creationId xmlns:a16="http://schemas.microsoft.com/office/drawing/2014/main" id="{F106ACE2-B951-49F4-85A8-F28FA5962952}"/>
+              </a:ext>
+            </a:extLst>
+          </p:cNvPr>
+          <p:cNvSpPr>
+            <a:spLocks noGrp="1"/>
+          </p:cNvSpPr>
+          <p:nvPr>
+            <p:ph idx="1"/>
+          </p:nvPr>
+        </p:nvSpPr>
+        <p:spPr>
+          <a:xfrm>
+            <a:off x="838200" y="1447529"/>
+            <a:ext cx="10515600" cy="2623539"/>
+          </a:xfrm>
+        </p:spPr>
+        <p:txBody>
+          <a:bodyPr>
+            <a:normAutofit/>
+          </a:bodyPr>
+          <a:lstStyle/>
+          <a:p>
+            <a:pPr algn="just"/>
+            <a:r>
+              <a:rPr lang="hu-HU" sz="1800" dirty="0" err="1">
+                <a:solidFill>
+                  <a:srgbClr val="002060"/>
+                </a:solidFill>
+                <a:latin typeface="Myriad "/>
+              </a:rPr>
+              <a:t>This</a:t>
+            </a:r>
+            <a:r>
+              <a:rPr lang="hu-HU" sz="1800" dirty="0">
+                <a:solidFill>
+                  <a:srgbClr val="002060"/>
+                </a:solidFill>
+                <a:latin typeface="Myriad "/>
+              </a:rPr>
+              <a:t> </a:t>
+            </a:r>
+            <a:r>
+              <a:rPr lang="hu-HU" sz="1800" dirty="0" err="1">
+                <a:solidFill>
+                  <a:srgbClr val="002060"/>
+                </a:solidFill>
+                <a:latin typeface="Myriad "/>
+              </a:rPr>
+              <a:t>method</a:t>
+            </a:r>
+            <a:r>
+              <a:rPr lang="hu-HU" sz="1800" dirty="0">
+                <a:solidFill>
+                  <a:srgbClr val="002060"/>
+                </a:solidFill>
+                <a:latin typeface="Myriad "/>
+              </a:rPr>
+              <a:t> is </a:t>
+            </a:r>
+            <a:r>
+              <a:rPr lang="hu-HU" sz="1800" dirty="0" err="1">
+                <a:solidFill>
+                  <a:srgbClr val="002060"/>
+                </a:solidFill>
+                <a:latin typeface="Myriad "/>
+              </a:rPr>
+              <a:t>still</a:t>
+            </a:r>
+            <a:r>
+              <a:rPr lang="hu-HU" sz="1800" dirty="0">
+                <a:solidFill>
+                  <a:srgbClr val="002060"/>
+                </a:solidFill>
+                <a:latin typeface="Myriad "/>
+              </a:rPr>
+              <a:t> </a:t>
+            </a:r>
+            <a:r>
+              <a:rPr lang="hu-HU" sz="1800" dirty="0" err="1">
+                <a:solidFill>
+                  <a:srgbClr val="002060"/>
+                </a:solidFill>
+                <a:latin typeface="Myriad "/>
+              </a:rPr>
+              <a:t>under</a:t>
+            </a:r>
+            <a:r>
+              <a:rPr lang="hu-HU" sz="1800" dirty="0">
+                <a:solidFill>
+                  <a:srgbClr val="002060"/>
+                </a:solidFill>
+                <a:latin typeface="Myriad "/>
+              </a:rPr>
+              <a:t> </a:t>
+            </a:r>
+            <a:r>
+              <a:rPr lang="hu-HU" sz="1800" dirty="0" err="1">
+                <a:solidFill>
+                  <a:srgbClr val="002060"/>
+                </a:solidFill>
+                <a:latin typeface="Myriad "/>
+              </a:rPr>
+              <a:t>development</a:t>
+            </a:r>
+            <a:r>
+              <a:rPr lang="hu-HU" sz="1800" dirty="0">
+                <a:solidFill>
+                  <a:srgbClr val="002060"/>
+                </a:solidFill>
+                <a:latin typeface="Myriad "/>
+              </a:rPr>
+              <a:t>.</a:t>
+            </a:r>
+            <a:endParaRPr lang="hu-HU" sz="1400" dirty="0">
+              <a:solidFill>
+                <a:srgbClr val="002060"/>
+              </a:solidFill>
+              <a:latin typeface="Myriad "/>
+            </a:endParaRPr>
+          </a:p>
+          <a:p>
+            <a:pPr algn="just"/>
+            <a:r>
+              <a:rPr lang="hu-HU" sz="1800" dirty="0">
+                <a:solidFill>
+                  <a:srgbClr val="002060"/>
+                </a:solidFill>
+                <a:latin typeface="Myriad "/>
+              </a:rPr>
+              <a:t>The </a:t>
+            </a:r>
+            <a:r>
+              <a:rPr lang="hu-HU" sz="1800" dirty="0" err="1">
+                <a:solidFill>
+                  <a:srgbClr val="002060"/>
+                </a:solidFill>
+                <a:latin typeface="Myriad "/>
+              </a:rPr>
+              <a:t>results</a:t>
+            </a:r>
+            <a:r>
+              <a:rPr lang="hu-HU" sz="1800" dirty="0">
+                <a:solidFill>
+                  <a:srgbClr val="002060"/>
+                </a:solidFill>
+                <a:latin typeface="Myriad "/>
+              </a:rPr>
+              <a:t> </a:t>
+            </a:r>
+            <a:r>
+              <a:rPr lang="hu-HU" sz="1800" dirty="0" err="1">
+                <a:solidFill>
+                  <a:srgbClr val="002060"/>
+                </a:solidFill>
+                <a:latin typeface="Myriad "/>
+              </a:rPr>
+              <a:t>for</a:t>
+            </a:r>
+            <a:r>
+              <a:rPr lang="hu-HU" sz="1800" dirty="0">
+                <a:solidFill>
+                  <a:srgbClr val="002060"/>
+                </a:solidFill>
+                <a:latin typeface="Myriad "/>
+              </a:rPr>
+              <a:t> </a:t>
+            </a:r>
+            <a:r>
+              <a:rPr lang="hu-HU" sz="1800" dirty="0" err="1">
+                <a:solidFill>
+                  <a:srgbClr val="002060"/>
+                </a:solidFill>
+                <a:latin typeface="Myriad "/>
+              </a:rPr>
+              <a:t>several</a:t>
+            </a:r>
+            <a:r>
+              <a:rPr lang="hu-HU" sz="1800" dirty="0">
+                <a:solidFill>
+                  <a:srgbClr val="002060"/>
+                </a:solidFill>
+                <a:latin typeface="Myriad "/>
+              </a:rPr>
+              <a:t> </a:t>
+            </a:r>
+            <a:r>
+              <a:rPr lang="hu-HU" sz="1800" dirty="0" err="1">
+                <a:solidFill>
+                  <a:srgbClr val="002060"/>
+                </a:solidFill>
+                <a:latin typeface="Myriad "/>
+              </a:rPr>
+              <a:t>countries</a:t>
+            </a:r>
+            <a:r>
+              <a:rPr lang="hu-HU" sz="1800" dirty="0">
+                <a:solidFill>
+                  <a:srgbClr val="002060"/>
+                </a:solidFill>
+                <a:latin typeface="Myriad "/>
+              </a:rPr>
+              <a:t> </a:t>
+            </a:r>
+            <a:r>
+              <a:rPr lang="hu-HU" sz="1800" dirty="0" err="1">
+                <a:solidFill>
+                  <a:srgbClr val="002060"/>
+                </a:solidFill>
+                <a:latin typeface="Myriad "/>
+              </a:rPr>
+              <a:t>suggest</a:t>
+            </a:r>
+            <a:r>
+              <a:rPr lang="hu-HU" sz="1800" dirty="0">
+                <a:solidFill>
+                  <a:srgbClr val="002060"/>
+                </a:solidFill>
+                <a:latin typeface="Myriad "/>
+              </a:rPr>
+              <a:t> </a:t>
+            </a:r>
+            <a:r>
+              <a:rPr lang="hu-HU" sz="1800" dirty="0" err="1">
+                <a:solidFill>
+                  <a:srgbClr val="002060"/>
+                </a:solidFill>
+                <a:latin typeface="Myriad "/>
+              </a:rPr>
+              <a:t>us</a:t>
+            </a:r>
+            <a:r>
+              <a:rPr lang="hu-HU" sz="1800" dirty="0">
+                <a:solidFill>
+                  <a:srgbClr val="002060"/>
+                </a:solidFill>
+                <a:latin typeface="Myriad "/>
+              </a:rPr>
+              <a:t> </a:t>
+            </a:r>
+            <a:r>
+              <a:rPr lang="hu-HU" sz="1800" dirty="0" err="1">
+                <a:solidFill>
+                  <a:srgbClr val="002060"/>
+                </a:solidFill>
+                <a:latin typeface="Myriad "/>
+              </a:rPr>
+              <a:t>that</a:t>
+            </a:r>
+            <a:r>
+              <a:rPr lang="hu-HU" sz="1800" dirty="0">
+                <a:solidFill>
+                  <a:srgbClr val="002060"/>
+                </a:solidFill>
+                <a:latin typeface="Myriad "/>
+              </a:rPr>
+              <a:t> </a:t>
+            </a:r>
+            <a:r>
+              <a:rPr lang="hu-HU" sz="1800" dirty="0" err="1">
+                <a:solidFill>
+                  <a:srgbClr val="002060"/>
+                </a:solidFill>
+                <a:latin typeface="Myriad "/>
+              </a:rPr>
+              <a:t>the</a:t>
+            </a:r>
+            <a:r>
+              <a:rPr lang="hu-HU" sz="1800" dirty="0">
+                <a:solidFill>
+                  <a:srgbClr val="002060"/>
+                </a:solidFill>
+                <a:latin typeface="Myriad "/>
+              </a:rPr>
+              <a:t> </a:t>
+            </a:r>
+            <a:r>
+              <a:rPr lang="hu-HU" sz="1800" dirty="0" err="1">
+                <a:solidFill>
+                  <a:srgbClr val="002060"/>
+                </a:solidFill>
+                <a:latin typeface="Myriad "/>
+              </a:rPr>
+              <a:t>direction</a:t>
+            </a:r>
+            <a:r>
+              <a:rPr lang="hu-HU" sz="1800" dirty="0">
+                <a:solidFill>
+                  <a:srgbClr val="002060"/>
+                </a:solidFill>
+                <a:latin typeface="Myriad "/>
+              </a:rPr>
+              <a:t> is </a:t>
+            </a:r>
+            <a:r>
+              <a:rPr lang="hu-HU" sz="1800" dirty="0" err="1">
+                <a:solidFill>
+                  <a:srgbClr val="002060"/>
+                </a:solidFill>
+                <a:latin typeface="Myriad "/>
+              </a:rPr>
+              <a:t>good</a:t>
+            </a:r>
+            <a:r>
+              <a:rPr lang="hu-HU" sz="1800" dirty="0">
+                <a:solidFill>
+                  <a:srgbClr val="002060"/>
+                </a:solidFill>
+                <a:latin typeface="Myriad "/>
+              </a:rPr>
+              <a:t>, </a:t>
+            </a:r>
+            <a:r>
+              <a:rPr lang="hu-HU" sz="1800" dirty="0" err="1">
+                <a:solidFill>
+                  <a:srgbClr val="002060"/>
+                </a:solidFill>
+                <a:latin typeface="Myriad "/>
+              </a:rPr>
+              <a:t>but</a:t>
+            </a:r>
+            <a:r>
+              <a:rPr lang="hu-HU" sz="1800" dirty="0">
+                <a:solidFill>
+                  <a:srgbClr val="002060"/>
+                </a:solidFill>
+                <a:latin typeface="Myriad "/>
+              </a:rPr>
+              <a:t> </a:t>
+            </a:r>
+            <a:r>
+              <a:rPr lang="hu-HU" sz="1800" dirty="0" err="1">
+                <a:solidFill>
+                  <a:srgbClr val="002060"/>
+                </a:solidFill>
+                <a:latin typeface="Myriad "/>
+              </a:rPr>
+              <a:t>we</a:t>
+            </a:r>
+            <a:r>
+              <a:rPr lang="hu-HU" sz="1800" dirty="0">
+                <a:solidFill>
+                  <a:srgbClr val="002060"/>
+                </a:solidFill>
+                <a:latin typeface="Myriad "/>
+              </a:rPr>
+              <a:t> </a:t>
+            </a:r>
+            <a:r>
+              <a:rPr lang="hu-HU" sz="1800" dirty="0" err="1">
+                <a:solidFill>
+                  <a:srgbClr val="002060"/>
+                </a:solidFill>
+                <a:latin typeface="Myriad "/>
+              </a:rPr>
+              <a:t>need</a:t>
+            </a:r>
+            <a:r>
+              <a:rPr lang="hu-HU" sz="1800" dirty="0">
+                <a:solidFill>
+                  <a:srgbClr val="002060"/>
+                </a:solidFill>
+                <a:latin typeface="Myriad "/>
+              </a:rPr>
+              <a:t> </a:t>
+            </a:r>
+            <a:r>
+              <a:rPr lang="hu-HU" sz="1800" dirty="0" err="1">
+                <a:solidFill>
+                  <a:srgbClr val="002060"/>
+                </a:solidFill>
+                <a:latin typeface="Myriad "/>
+              </a:rPr>
+              <a:t>some</a:t>
+            </a:r>
+            <a:r>
+              <a:rPr lang="hu-HU" sz="1800" dirty="0">
+                <a:solidFill>
+                  <a:srgbClr val="002060"/>
+                </a:solidFill>
+                <a:latin typeface="Myriad "/>
+              </a:rPr>
+              <a:t> </a:t>
+            </a:r>
+            <a:r>
+              <a:rPr lang="hu-HU" sz="1800" dirty="0" err="1">
+                <a:solidFill>
+                  <a:srgbClr val="002060"/>
+                </a:solidFill>
+                <a:latin typeface="Myriad "/>
+              </a:rPr>
+              <a:t>further</a:t>
+            </a:r>
+            <a:r>
+              <a:rPr lang="hu-HU" sz="1800" dirty="0">
+                <a:solidFill>
+                  <a:srgbClr val="002060"/>
+                </a:solidFill>
+                <a:latin typeface="Myriad "/>
+              </a:rPr>
+              <a:t> </a:t>
+            </a:r>
+            <a:r>
+              <a:rPr lang="hu-HU" sz="1800" dirty="0" err="1">
+                <a:solidFill>
+                  <a:srgbClr val="002060"/>
+                </a:solidFill>
+                <a:latin typeface="Myriad "/>
+              </a:rPr>
+              <a:t>tweaks</a:t>
+            </a:r>
+            <a:r>
+              <a:rPr lang="hu-HU" sz="1800" dirty="0">
+                <a:solidFill>
+                  <a:srgbClr val="002060"/>
+                </a:solidFill>
+                <a:latin typeface="Myriad "/>
+              </a:rPr>
+              <a:t> </a:t>
+            </a:r>
+            <a:r>
+              <a:rPr lang="hu-HU" sz="1800" dirty="0" err="1">
+                <a:solidFill>
+                  <a:srgbClr val="002060"/>
+                </a:solidFill>
+                <a:latin typeface="Myriad "/>
+              </a:rPr>
+              <a:t>to</a:t>
+            </a:r>
+            <a:r>
+              <a:rPr lang="hu-HU" sz="1800" dirty="0">
+                <a:solidFill>
+                  <a:srgbClr val="002060"/>
+                </a:solidFill>
+                <a:latin typeface="Myriad "/>
+              </a:rPr>
+              <a:t> </a:t>
+            </a:r>
+            <a:r>
+              <a:rPr lang="hu-HU" sz="1800" dirty="0" err="1">
+                <a:solidFill>
+                  <a:srgbClr val="002060"/>
+                </a:solidFill>
+                <a:latin typeface="Myriad "/>
+              </a:rPr>
+              <a:t>reach</a:t>
+            </a:r>
+            <a:r>
+              <a:rPr lang="hu-HU" sz="1800" dirty="0">
+                <a:solidFill>
+                  <a:srgbClr val="002060"/>
+                </a:solidFill>
+                <a:latin typeface="Myriad "/>
+              </a:rPr>
+              <a:t> a </a:t>
+            </a:r>
+            <a:r>
+              <a:rPr lang="hu-HU" sz="1800" dirty="0" err="1">
+                <a:solidFill>
+                  <a:srgbClr val="002060"/>
+                </a:solidFill>
+                <a:latin typeface="Myriad "/>
+              </a:rPr>
+              <a:t>generally</a:t>
+            </a:r>
+            <a:r>
+              <a:rPr lang="hu-HU" sz="1800" dirty="0">
+                <a:solidFill>
+                  <a:srgbClr val="002060"/>
+                </a:solidFill>
+                <a:latin typeface="Myriad "/>
+              </a:rPr>
+              <a:t> </a:t>
+            </a:r>
+            <a:r>
+              <a:rPr lang="hu-HU" sz="1800" dirty="0" err="1">
+                <a:solidFill>
+                  <a:srgbClr val="002060"/>
+                </a:solidFill>
+                <a:latin typeface="Myriad "/>
+              </a:rPr>
+              <a:t>well</a:t>
+            </a:r>
+            <a:r>
+              <a:rPr lang="hu-HU" sz="1800" dirty="0">
+                <a:solidFill>
+                  <a:srgbClr val="002060"/>
+                </a:solidFill>
+                <a:latin typeface="Myriad "/>
+              </a:rPr>
+              <a:t> </a:t>
+            </a:r>
+            <a:r>
+              <a:rPr lang="hu-HU" sz="1800" dirty="0" err="1">
+                <a:solidFill>
+                  <a:srgbClr val="002060"/>
+                </a:solidFill>
+                <a:latin typeface="Myriad "/>
+              </a:rPr>
+              <a:t>behaving</a:t>
+            </a:r>
+            <a:r>
+              <a:rPr lang="hu-HU" sz="1800" dirty="0">
+                <a:solidFill>
+                  <a:srgbClr val="002060"/>
+                </a:solidFill>
+                <a:latin typeface="Myriad "/>
+              </a:rPr>
+              <a:t> estimator.</a:t>
+            </a:r>
+          </a:p>
+          <a:p>
+            <a:pPr algn="just"/>
+            <a:r>
+              <a:rPr lang="hu-HU" sz="1800" dirty="0" err="1">
+                <a:solidFill>
+                  <a:srgbClr val="002060"/>
+                </a:solidFill>
+                <a:latin typeface="Myriad "/>
+              </a:rPr>
+              <a:t>Comparing</a:t>
+            </a:r>
+            <a:r>
+              <a:rPr lang="hu-HU" sz="1800" dirty="0">
+                <a:solidFill>
+                  <a:srgbClr val="002060"/>
+                </a:solidFill>
+                <a:latin typeface="Myriad "/>
+              </a:rPr>
+              <a:t> </a:t>
+            </a:r>
+            <a:r>
+              <a:rPr lang="hu-HU" sz="1800" dirty="0" err="1">
+                <a:solidFill>
+                  <a:srgbClr val="002060"/>
+                </a:solidFill>
+                <a:latin typeface="Myriad "/>
+              </a:rPr>
+              <a:t>our</a:t>
+            </a:r>
+            <a:r>
+              <a:rPr lang="hu-HU" sz="1800" dirty="0">
+                <a:solidFill>
+                  <a:srgbClr val="002060"/>
+                </a:solidFill>
+                <a:latin typeface="Myriad "/>
+              </a:rPr>
+              <a:t> top 5 </a:t>
+            </a:r>
+            <a:r>
+              <a:rPr lang="hu-HU" sz="1800" dirty="0" err="1">
+                <a:solidFill>
+                  <a:srgbClr val="002060"/>
+                </a:solidFill>
+                <a:latin typeface="Myriad "/>
+              </a:rPr>
+              <a:t>predictions</a:t>
+            </a:r>
+            <a:r>
+              <a:rPr lang="hu-HU" sz="1800" dirty="0">
+                <a:solidFill>
+                  <a:srgbClr val="002060"/>
+                </a:solidFill>
+                <a:latin typeface="Myriad "/>
+              </a:rPr>
+              <a:t> </a:t>
+            </a:r>
+            <a:r>
+              <a:rPr lang="hu-HU" sz="1800" dirty="0" err="1">
+                <a:solidFill>
+                  <a:srgbClr val="002060"/>
+                </a:solidFill>
+                <a:latin typeface="Myriad "/>
+              </a:rPr>
+              <a:t>between</a:t>
+            </a:r>
+            <a:r>
+              <a:rPr lang="hu-HU" sz="1800" dirty="0">
+                <a:solidFill>
+                  <a:srgbClr val="002060"/>
+                </a:solidFill>
+                <a:latin typeface="Myriad "/>
+              </a:rPr>
+              <a:t> November and </a:t>
+            </a:r>
+            <a:r>
+              <a:rPr lang="hu-HU" sz="1800" dirty="0" err="1">
+                <a:solidFill>
+                  <a:srgbClr val="002060"/>
+                </a:solidFill>
+                <a:latin typeface="Myriad "/>
+              </a:rPr>
+              <a:t>April</a:t>
+            </a:r>
+            <a:r>
+              <a:rPr lang="hu-HU" sz="1800" dirty="0">
+                <a:solidFill>
+                  <a:srgbClr val="002060"/>
+                </a:solidFill>
+                <a:latin typeface="Myriad "/>
+              </a:rPr>
+              <a:t> </a:t>
+            </a:r>
+            <a:r>
+              <a:rPr lang="hu-HU" sz="1800" dirty="0" err="1">
+                <a:solidFill>
+                  <a:srgbClr val="002060"/>
+                </a:solidFill>
+                <a:latin typeface="Myriad "/>
+              </a:rPr>
+              <a:t>we</a:t>
+            </a:r>
+            <a:r>
+              <a:rPr lang="hu-HU" sz="1800" dirty="0">
+                <a:solidFill>
+                  <a:srgbClr val="002060"/>
+                </a:solidFill>
+                <a:latin typeface="Myriad "/>
+              </a:rPr>
+              <a:t> </a:t>
+            </a:r>
+            <a:r>
+              <a:rPr lang="hu-HU" sz="1800" dirty="0" err="1">
+                <a:solidFill>
+                  <a:srgbClr val="002060"/>
+                </a:solidFill>
+                <a:latin typeface="Myriad "/>
+              </a:rPr>
+              <a:t>could</a:t>
+            </a:r>
+            <a:r>
+              <a:rPr lang="hu-HU" sz="1800" dirty="0">
+                <a:solidFill>
+                  <a:srgbClr val="002060"/>
+                </a:solidFill>
+                <a:latin typeface="Myriad "/>
+              </a:rPr>
+              <a:t> </a:t>
+            </a:r>
+            <a:r>
+              <a:rPr lang="hu-HU" sz="1800" dirty="0" err="1">
+                <a:solidFill>
+                  <a:srgbClr val="002060"/>
+                </a:solidFill>
+                <a:latin typeface="Myriad "/>
+              </a:rPr>
+              <a:t>provide</a:t>
+            </a:r>
+            <a:r>
+              <a:rPr lang="hu-HU" sz="1800" dirty="0">
+                <a:solidFill>
+                  <a:srgbClr val="002060"/>
+                </a:solidFill>
+                <a:latin typeface="Myriad "/>
+              </a:rPr>
+              <a:t> </a:t>
+            </a:r>
+            <a:r>
+              <a:rPr lang="hu-HU" sz="1800" dirty="0" err="1">
+                <a:solidFill>
+                  <a:srgbClr val="002060"/>
+                </a:solidFill>
+                <a:latin typeface="Myriad "/>
+              </a:rPr>
+              <a:t>very</a:t>
+            </a:r>
+            <a:r>
+              <a:rPr lang="hu-HU" sz="1800" dirty="0">
+                <a:solidFill>
+                  <a:srgbClr val="002060"/>
+                </a:solidFill>
+                <a:latin typeface="Myriad "/>
+              </a:rPr>
+              <a:t> consistent </a:t>
+            </a:r>
+            <a:r>
+              <a:rPr lang="hu-HU" sz="1800" dirty="0" err="1">
+                <a:solidFill>
+                  <a:srgbClr val="002060"/>
+                </a:solidFill>
+                <a:latin typeface="Myriad "/>
+              </a:rPr>
+              <a:t>results</a:t>
+            </a:r>
+            <a:r>
+              <a:rPr lang="hu-HU" sz="1800" dirty="0">
+                <a:solidFill>
+                  <a:srgbClr val="002060"/>
+                </a:solidFill>
+                <a:latin typeface="Myriad "/>
+              </a:rPr>
+              <a:t>. </a:t>
+            </a:r>
+            <a:r>
+              <a:rPr lang="hu-HU" sz="1800" dirty="0" err="1">
+                <a:solidFill>
+                  <a:srgbClr val="002060"/>
+                </a:solidFill>
+                <a:latin typeface="Myriad "/>
+              </a:rPr>
+              <a:t>Our</a:t>
+            </a:r>
+            <a:r>
+              <a:rPr lang="hu-HU" sz="1800" dirty="0">
+                <a:solidFill>
+                  <a:srgbClr val="002060"/>
+                </a:solidFill>
+                <a:latin typeface="Myriad "/>
+              </a:rPr>
+              <a:t> </a:t>
+            </a:r>
+            <a:r>
+              <a:rPr lang="hu-HU" sz="1800" dirty="0" err="1">
+                <a:solidFill>
+                  <a:srgbClr val="002060"/>
+                </a:solidFill>
+                <a:latin typeface="Myriad "/>
+              </a:rPr>
+              <a:t>placements</a:t>
+            </a:r>
+            <a:r>
+              <a:rPr lang="hu-HU" sz="1800" dirty="0">
+                <a:solidFill>
+                  <a:srgbClr val="002060"/>
+                </a:solidFill>
+                <a:latin typeface="Myriad "/>
+              </a:rPr>
+              <a:t> </a:t>
+            </a:r>
+            <a:r>
+              <a:rPr lang="hu-HU" sz="1800" dirty="0" err="1">
+                <a:solidFill>
+                  <a:srgbClr val="002060"/>
+                </a:solidFill>
+                <a:latin typeface="Myriad "/>
+              </a:rPr>
+              <a:t>are</a:t>
+            </a:r>
+            <a:r>
+              <a:rPr lang="hu-HU" sz="1800" dirty="0">
+                <a:solidFill>
+                  <a:srgbClr val="002060"/>
+                </a:solidFill>
+                <a:latin typeface="Myriad "/>
+              </a:rPr>
+              <a:t> 2, 4, 2, 4, 4 and </a:t>
+            </a:r>
+            <a:r>
+              <a:rPr lang="hu-HU" sz="1800" dirty="0" err="1">
+                <a:solidFill>
+                  <a:srgbClr val="002060"/>
+                </a:solidFill>
+                <a:latin typeface="Myriad "/>
+              </a:rPr>
+              <a:t>x.</a:t>
+            </a:r>
+            <a:endParaRPr lang="hu-HU" sz="1800" dirty="0">
+              <a:solidFill>
+                <a:srgbClr val="002060"/>
+              </a:solidFill>
+              <a:latin typeface="Myriad "/>
+            </a:endParaRPr>
+          </a:p>
+          <a:p>
+            <a:pPr algn="just"/>
+            <a:r>
+              <a:rPr lang="hu-HU" sz="1800" dirty="0" err="1">
+                <a:solidFill>
+                  <a:srgbClr val="002060"/>
+                </a:solidFill>
+                <a:latin typeface="Myriad "/>
+              </a:rPr>
+              <a:t>We</a:t>
+            </a:r>
+            <a:r>
+              <a:rPr lang="hu-HU" sz="1800" dirty="0">
+                <a:solidFill>
+                  <a:srgbClr val="002060"/>
+                </a:solidFill>
+                <a:latin typeface="Myriad "/>
+              </a:rPr>
+              <a:t> </a:t>
+            </a:r>
+            <a:r>
+              <a:rPr lang="hu-HU" sz="1800" dirty="0" err="1">
+                <a:solidFill>
+                  <a:srgbClr val="002060"/>
+                </a:solidFill>
+                <a:latin typeface="Myriad "/>
+              </a:rPr>
+              <a:t>plan</a:t>
+            </a:r>
+            <a:r>
+              <a:rPr lang="hu-HU" sz="1800" dirty="0">
+                <a:solidFill>
+                  <a:srgbClr val="002060"/>
+                </a:solidFill>
+                <a:latin typeface="Myriad "/>
+              </a:rPr>
+              <a:t> </a:t>
+            </a:r>
+            <a:r>
+              <a:rPr lang="hu-HU" sz="1800" dirty="0" err="1">
+                <a:solidFill>
+                  <a:srgbClr val="002060"/>
+                </a:solidFill>
+                <a:latin typeface="Myriad "/>
+              </a:rPr>
+              <a:t>to</a:t>
+            </a:r>
+            <a:r>
+              <a:rPr lang="hu-HU" sz="1800" dirty="0">
+                <a:solidFill>
+                  <a:srgbClr val="002060"/>
+                </a:solidFill>
+                <a:latin typeface="Myriad "/>
+              </a:rPr>
+              <a:t> </a:t>
+            </a:r>
+            <a:r>
+              <a:rPr lang="hu-HU" sz="1800" dirty="0" err="1">
+                <a:solidFill>
+                  <a:srgbClr val="002060"/>
+                </a:solidFill>
+                <a:latin typeface="Myriad "/>
+              </a:rPr>
+              <a:t>generalize</a:t>
+            </a:r>
+            <a:r>
+              <a:rPr lang="hu-HU" sz="1800" dirty="0">
+                <a:solidFill>
+                  <a:srgbClr val="002060"/>
+                </a:solidFill>
+                <a:latin typeface="Myriad "/>
+              </a:rPr>
+              <a:t> </a:t>
+            </a:r>
+            <a:r>
+              <a:rPr lang="hu-HU" sz="1800" dirty="0" err="1">
+                <a:solidFill>
+                  <a:srgbClr val="002060"/>
+                </a:solidFill>
+                <a:latin typeface="Myriad "/>
+              </a:rPr>
+              <a:t>further</a:t>
+            </a:r>
+            <a:r>
+              <a:rPr lang="hu-HU" sz="1800" dirty="0">
+                <a:solidFill>
+                  <a:srgbClr val="002060"/>
+                </a:solidFill>
+                <a:latin typeface="Myriad "/>
+              </a:rPr>
+              <a:t> </a:t>
+            </a:r>
+            <a:r>
+              <a:rPr lang="hu-HU" sz="1800" dirty="0" err="1">
+                <a:solidFill>
+                  <a:srgbClr val="002060"/>
+                </a:solidFill>
+                <a:latin typeface="Myriad "/>
+              </a:rPr>
+              <a:t>the</a:t>
+            </a:r>
+            <a:r>
+              <a:rPr lang="hu-HU" sz="1800" dirty="0">
+                <a:solidFill>
+                  <a:srgbClr val="002060"/>
+                </a:solidFill>
+                <a:latin typeface="Myriad "/>
+              </a:rPr>
+              <a:t> </a:t>
+            </a:r>
+            <a:r>
+              <a:rPr lang="hu-HU" sz="1800" dirty="0" err="1">
+                <a:solidFill>
+                  <a:srgbClr val="002060"/>
+                </a:solidFill>
+                <a:latin typeface="Myriad "/>
+              </a:rPr>
+              <a:t>method</a:t>
+            </a:r>
+            <a:r>
+              <a:rPr lang="hu-HU" sz="1800" dirty="0">
+                <a:solidFill>
+                  <a:srgbClr val="002060"/>
+                </a:solidFill>
+                <a:latin typeface="Myriad "/>
+              </a:rPr>
+              <a:t> </a:t>
+            </a:r>
+            <a:r>
+              <a:rPr lang="hu-HU" sz="1800" dirty="0" err="1">
+                <a:solidFill>
+                  <a:srgbClr val="002060"/>
+                </a:solidFill>
+                <a:latin typeface="Myriad "/>
+              </a:rPr>
+              <a:t>to</a:t>
+            </a:r>
+            <a:r>
+              <a:rPr lang="hu-HU" sz="1800" dirty="0">
+                <a:solidFill>
+                  <a:srgbClr val="002060"/>
+                </a:solidFill>
+                <a:latin typeface="Myriad "/>
+              </a:rPr>
+              <a:t> </a:t>
+            </a:r>
+            <a:r>
+              <a:rPr lang="hu-HU" sz="1800" dirty="0" err="1">
+                <a:solidFill>
+                  <a:srgbClr val="002060"/>
+                </a:solidFill>
+                <a:latin typeface="Myriad "/>
+              </a:rPr>
+              <a:t>become</a:t>
+            </a:r>
+            <a:r>
+              <a:rPr lang="hu-HU" sz="1800" dirty="0">
+                <a:solidFill>
+                  <a:srgbClr val="002060"/>
+                </a:solidFill>
+                <a:latin typeface="Myriad "/>
+              </a:rPr>
+              <a:t> a </a:t>
+            </a:r>
+            <a:r>
+              <a:rPr lang="hu-HU" sz="1800" dirty="0" err="1">
+                <a:solidFill>
+                  <a:srgbClr val="002060"/>
+                </a:solidFill>
+                <a:latin typeface="Myriad "/>
+              </a:rPr>
+              <a:t>time</a:t>
+            </a:r>
+            <a:r>
+              <a:rPr lang="hu-HU" sz="1800" dirty="0">
+                <a:solidFill>
+                  <a:srgbClr val="002060"/>
+                </a:solidFill>
+                <a:latin typeface="Myriad "/>
+              </a:rPr>
+              <a:t> </a:t>
+            </a:r>
+            <a:r>
+              <a:rPr lang="hu-HU" sz="1800" dirty="0" err="1">
+                <a:solidFill>
+                  <a:srgbClr val="002060"/>
+                </a:solidFill>
+                <a:latin typeface="Myriad "/>
+              </a:rPr>
+              <a:t>series</a:t>
+            </a:r>
+            <a:r>
+              <a:rPr lang="hu-HU" sz="1800" dirty="0">
+                <a:solidFill>
+                  <a:srgbClr val="002060"/>
+                </a:solidFill>
+                <a:latin typeface="Myriad "/>
+              </a:rPr>
+              <a:t> nowcasting </a:t>
+            </a:r>
+            <a:r>
+              <a:rPr lang="hu-HU" sz="1800" dirty="0" err="1">
+                <a:solidFill>
+                  <a:srgbClr val="002060"/>
+                </a:solidFill>
+                <a:latin typeface="Myriad "/>
+              </a:rPr>
+              <a:t>tool</a:t>
+            </a:r>
+            <a:r>
+              <a:rPr lang="hu-HU" sz="1800" dirty="0">
+                <a:solidFill>
+                  <a:srgbClr val="002060"/>
+                </a:solidFill>
+                <a:latin typeface="Myriad "/>
+              </a:rPr>
+              <a:t> </a:t>
+            </a:r>
+            <a:r>
+              <a:rPr lang="hu-HU" sz="1800" dirty="0" err="1">
+                <a:solidFill>
+                  <a:srgbClr val="002060"/>
+                </a:solidFill>
+                <a:latin typeface="Myriad "/>
+              </a:rPr>
+              <a:t>for</a:t>
+            </a:r>
+            <a:r>
+              <a:rPr lang="hu-HU" sz="1800" dirty="0">
+                <a:solidFill>
+                  <a:srgbClr val="002060"/>
+                </a:solidFill>
+                <a:latin typeface="Myriad "/>
+              </a:rPr>
+              <a:t> </a:t>
+            </a:r>
+            <a:r>
+              <a:rPr lang="hu-HU" sz="1800" dirty="0" err="1">
+                <a:solidFill>
+                  <a:srgbClr val="002060"/>
+                </a:solidFill>
+                <a:latin typeface="Myriad "/>
+              </a:rPr>
+              <a:t>general</a:t>
+            </a:r>
+            <a:r>
+              <a:rPr lang="hu-HU" sz="1800" dirty="0">
+                <a:solidFill>
+                  <a:srgbClr val="002060"/>
+                </a:solidFill>
+                <a:latin typeface="Myriad "/>
+              </a:rPr>
+              <a:t> </a:t>
+            </a:r>
+            <a:r>
+              <a:rPr lang="hu-HU" sz="1800" dirty="0" err="1">
+                <a:solidFill>
+                  <a:srgbClr val="002060"/>
+                </a:solidFill>
+                <a:latin typeface="Myriad "/>
+              </a:rPr>
+              <a:t>purpose</a:t>
+            </a:r>
+            <a:r>
+              <a:rPr lang="hu-HU" sz="1800" dirty="0">
+                <a:solidFill>
+                  <a:srgbClr val="002060"/>
+                </a:solidFill>
+                <a:latin typeface="Myriad "/>
+              </a:rPr>
+              <a:t>.</a:t>
+            </a:r>
+          </a:p>
+          <a:p>
+            <a:pPr lvl="1" algn="just"/>
+            <a:r>
+              <a:rPr lang="hu-HU" sz="1400" dirty="0" err="1">
+                <a:solidFill>
+                  <a:srgbClr val="002060"/>
+                </a:solidFill>
+                <a:latin typeface="Myriad "/>
+              </a:rPr>
+              <a:t>Also</a:t>
+            </a:r>
+            <a:r>
+              <a:rPr lang="hu-HU" sz="1400">
+                <a:solidFill>
+                  <a:srgbClr val="002060"/>
+                </a:solidFill>
+                <a:latin typeface="Myriad "/>
+              </a:rPr>
+              <a:t>, </a:t>
+            </a:r>
+            <a:r>
+              <a:rPr lang="hu-HU" sz="1400" dirty="0" err="1">
+                <a:solidFill>
+                  <a:srgbClr val="002060"/>
+                </a:solidFill>
+                <a:latin typeface="Myriad "/>
+              </a:rPr>
+              <a:t>thinking</a:t>
+            </a:r>
+            <a:r>
+              <a:rPr lang="hu-HU" sz="1400" dirty="0">
+                <a:solidFill>
+                  <a:srgbClr val="002060"/>
+                </a:solidFill>
+                <a:latin typeface="Myriad "/>
+              </a:rPr>
+              <a:t> </a:t>
+            </a:r>
+            <a:r>
+              <a:rPr lang="hu-HU" sz="1400" dirty="0" err="1">
+                <a:solidFill>
+                  <a:srgbClr val="002060"/>
+                </a:solidFill>
+                <a:latin typeface="Myriad "/>
+              </a:rPr>
+              <a:t>on</a:t>
+            </a:r>
+            <a:r>
+              <a:rPr lang="hu-HU" sz="1400" dirty="0">
+                <a:solidFill>
+                  <a:srgbClr val="002060"/>
+                </a:solidFill>
+                <a:latin typeface="Myriad "/>
+              </a:rPr>
+              <a:t> a web </a:t>
+            </a:r>
+            <a:r>
+              <a:rPr lang="hu-HU" sz="1400" dirty="0" err="1">
+                <a:solidFill>
+                  <a:srgbClr val="002060"/>
+                </a:solidFill>
+                <a:latin typeface="Myriad "/>
+              </a:rPr>
+              <a:t>application</a:t>
+            </a:r>
+            <a:r>
+              <a:rPr lang="hu-HU" sz="1400" dirty="0">
+                <a:solidFill>
+                  <a:srgbClr val="002060"/>
+                </a:solidFill>
+                <a:latin typeface="Myriad "/>
+              </a:rPr>
+              <a:t> </a:t>
+            </a:r>
+            <a:r>
+              <a:rPr lang="hu-HU" sz="1400" dirty="0" err="1">
+                <a:solidFill>
+                  <a:srgbClr val="002060"/>
+                </a:solidFill>
+                <a:latin typeface="Myriad "/>
+              </a:rPr>
+              <a:t>that</a:t>
+            </a:r>
+            <a:r>
+              <a:rPr lang="hu-HU" sz="1400" dirty="0">
+                <a:solidFill>
+                  <a:srgbClr val="002060"/>
+                </a:solidFill>
+                <a:latin typeface="Myriad "/>
+              </a:rPr>
+              <a:t> </a:t>
+            </a:r>
+            <a:r>
+              <a:rPr lang="hu-HU" sz="1400" dirty="0" err="1">
+                <a:solidFill>
+                  <a:srgbClr val="002060"/>
+                </a:solidFill>
+                <a:latin typeface="Myriad "/>
+              </a:rPr>
+              <a:t>could</a:t>
+            </a:r>
+            <a:r>
+              <a:rPr lang="hu-HU" sz="1400" dirty="0">
+                <a:solidFill>
+                  <a:srgbClr val="002060"/>
+                </a:solidFill>
+                <a:latin typeface="Myriad "/>
+              </a:rPr>
+              <a:t> </a:t>
+            </a:r>
+            <a:r>
+              <a:rPr lang="hu-HU" sz="1400" dirty="0" err="1">
+                <a:solidFill>
+                  <a:srgbClr val="002060"/>
+                </a:solidFill>
+                <a:latin typeface="Myriad "/>
+              </a:rPr>
+              <a:t>help</a:t>
+            </a:r>
+            <a:r>
+              <a:rPr lang="hu-HU" sz="1400" dirty="0">
+                <a:solidFill>
+                  <a:srgbClr val="002060"/>
+                </a:solidFill>
+                <a:latin typeface="Myriad "/>
+              </a:rPr>
+              <a:t> in </a:t>
+            </a:r>
+            <a:r>
+              <a:rPr lang="hu-HU" sz="1400" dirty="0" err="1">
+                <a:solidFill>
+                  <a:srgbClr val="002060"/>
+                </a:solidFill>
+                <a:latin typeface="Myriad "/>
+              </a:rPr>
+              <a:t>providing</a:t>
+            </a:r>
+            <a:r>
+              <a:rPr lang="hu-HU" sz="1400" dirty="0">
+                <a:solidFill>
+                  <a:srgbClr val="002060"/>
+                </a:solidFill>
+                <a:latin typeface="Myriad "/>
+              </a:rPr>
+              <a:t> </a:t>
+            </a:r>
+            <a:r>
+              <a:rPr lang="hu-HU" sz="1400" dirty="0" err="1">
+                <a:solidFill>
+                  <a:srgbClr val="002060"/>
+                </a:solidFill>
+                <a:latin typeface="Myriad "/>
+              </a:rPr>
+              <a:t>estimates</a:t>
+            </a:r>
+            <a:r>
+              <a:rPr lang="hu-HU" sz="1400" dirty="0">
+                <a:solidFill>
+                  <a:srgbClr val="002060"/>
+                </a:solidFill>
+                <a:latin typeface="Myriad "/>
+              </a:rPr>
+              <a:t>.</a:t>
+            </a:r>
+          </a:p>
+          <a:p>
+            <a:pPr algn="just"/>
+            <a:r>
+              <a:rPr lang="hu-HU" sz="1800" dirty="0" err="1">
+                <a:solidFill>
+                  <a:srgbClr val="002060"/>
+                </a:solidFill>
+                <a:latin typeface="Myriad "/>
+              </a:rPr>
+              <a:t>Any</a:t>
+            </a:r>
+            <a:r>
+              <a:rPr lang="hu-HU" sz="1800" dirty="0">
+                <a:solidFill>
+                  <a:srgbClr val="002060"/>
+                </a:solidFill>
+                <a:latin typeface="Myriad "/>
+              </a:rPr>
+              <a:t> </a:t>
+            </a:r>
+            <a:r>
+              <a:rPr lang="hu-HU" sz="1800" dirty="0" err="1">
+                <a:solidFill>
+                  <a:srgbClr val="002060"/>
+                </a:solidFill>
+                <a:latin typeface="Myriad "/>
+              </a:rPr>
+              <a:t>suggestions</a:t>
+            </a:r>
+            <a:r>
+              <a:rPr lang="hu-HU" sz="1800" dirty="0">
+                <a:solidFill>
+                  <a:srgbClr val="002060"/>
+                </a:solidFill>
+                <a:latin typeface="Myriad "/>
+              </a:rPr>
+              <a:t> </a:t>
+            </a:r>
+            <a:r>
+              <a:rPr lang="hu-HU" sz="1800" dirty="0" err="1">
+                <a:solidFill>
+                  <a:srgbClr val="002060"/>
+                </a:solidFill>
+                <a:latin typeface="Myriad "/>
+              </a:rPr>
+              <a:t>are</a:t>
+            </a:r>
+            <a:r>
+              <a:rPr lang="hu-HU" sz="1800" dirty="0">
+                <a:solidFill>
+                  <a:srgbClr val="002060"/>
+                </a:solidFill>
+                <a:latin typeface="Myriad "/>
+              </a:rPr>
+              <a:t> </a:t>
+            </a:r>
+            <a:r>
+              <a:rPr lang="hu-HU" sz="1800" dirty="0" err="1">
+                <a:solidFill>
+                  <a:srgbClr val="002060"/>
+                </a:solidFill>
+                <a:latin typeface="Myriad "/>
+              </a:rPr>
+              <a:t>welcome</a:t>
+            </a:r>
+            <a:r>
+              <a:rPr lang="hu-HU" sz="1800" dirty="0">
+                <a:solidFill>
+                  <a:srgbClr val="002060"/>
+                </a:solidFill>
+                <a:latin typeface="Myriad "/>
+              </a:rPr>
+              <a:t>!</a:t>
+            </a:r>
+          </a:p>
+          <a:p>
+            <a:pPr marL="0" indent="0" algn="just">
+              <a:buNone/>
+            </a:pPr>
+            <a:endParaRPr lang="hu-HU" sz="1800" dirty="0">
+              <a:solidFill>
+                <a:srgbClr val="002060"/>
+              </a:solidFill>
+              <a:latin typeface="Myriad "/>
+            </a:endParaRPr>
+          </a:p>
+        </p:txBody>
+      </p:sp>
+      <p:sp>
+        <p:nvSpPr>
+          <p:cNvPr id="4" name="Dia számának helye 3">
+            <a:extLst>
+              <a:ext uri="{FF2B5EF4-FFF2-40B4-BE49-F238E27FC236}">
+                <a16:creationId xmlns:a16="http://schemas.microsoft.com/office/drawing/2014/main" id="{2987F5AC-26F4-4688-86E4-7AD017CD3D04}"/>
+              </a:ext>
+            </a:extLst>
+          </p:cNvPr>
+          <p:cNvSpPr>
+            <a:spLocks noGrp="1"/>
+          </p:cNvSpPr>
+          <p:nvPr>
+            <p:ph type="sldNum" sz="quarter" idx="12"/>
+          </p:nvPr>
+        </p:nvSpPr>
+        <p:spPr/>
+        <p:txBody>
+          <a:bodyPr/>
+          <a:lstStyle/>
+          <a:p>
+            <a:fld id="{80DEC6E1-F1C1-444D-8DA3-0621314F7DF1}" type="slidenum">
+              <a:rPr lang="hu-HU" smtClean="0"/>
+              <a:t>15</a:t>
             </a:fld>
             <a:endParaRPr lang="hu-HU"/>
           </a:p>
@@ -11112,7 +12596,7 @@
                 </a:solidFill>
                 <a:latin typeface="Myriad "/>
               </a:rPr>
-              <a:t>. 2022- </a:t>
+              <a:t>. 01, 2022- </a:t>
             </a:r>
             <a:r>
               <a:rPr lang="hu-HU" sz="2200" dirty="0" err="1">
@@ -11130,7 +12614,7 @@
                 </a:solidFill>
                 <a:latin typeface="Myriad "/>
               </a:rPr>
-              <a:t>. 2023. </a:t>
+              <a:t>. 30, 2023. </a:t>
             </a:r>
           </a:p>
           <a:p>
@@ -20404,6 +21888,21 @@
 </file>
 
 <file path=customXml/item1.xml><?xml version="1.0" encoding="utf-8"?>
+<p:properties xmlns:p="http://schemas.microsoft.com/office/2006/metadata/properties" xmlns:xsi="http://www.w3.org/2001/XMLSchema-instance" xmlns:pc="http://schemas.microsoft.com/office/infopath/2007/PartnerControls">
+  <documentManagement/>
+</p:properties>
+</file>
+
+<file path=customXml/item2.xml><?xml version="1.0" encoding="utf-8"?>
+<?mso-contentType ?>
+<FormTemplates xmlns="http://schemas.microsoft.com/sharepoint/v3/contenttype/forms">
+  <Display>DocumentLibraryForm</Display>
+  <Edit>DocumentLibraryForm</Edit>
+  <New>DocumentLibraryForm</New>
+</FormTemplates>
+</file>
+
+<file path=customXml/item3.xml><?xml version="1.0" encoding="utf-8"?>
 <ct:contentTypeSchema xmlns:ct="http://schemas.microsoft.com/office/2006/metadata/contentType" xmlns:ma="http://schemas.microsoft.com/office/2006/metadata/properties/metaAttributes" ct:_="" ma:_="" ma:contentTypeName="Dokumentum" ma:contentTypeID="0x0101000FDB48AD5866D645BB0EE4F460BF82F1" ma:contentTypeVersion="0" ma:contentTypeDescription="Új dokumentum létrehozása." ma:contentTypeScope="" ma:versionID="c2905b2c3e1aa4985b7e2496453a0314">
   <xsd:schema xmlns:xsd="http://www.w3.org/2001/XMLSchema" xmlns:xs="http://www.w3.org/2001/XMLSchema" xmlns:p="http://schemas.microsoft.com/office/2006/metadata/properties" targetNamespace="http://schemas.microsoft.com/office/2006/metadata/properties" ma:root="true" ma:fieldsID="08dee037046ad32af3116d3be75d37a6">
     <xsd:element name="properties">
@@ -20517,32 +22016,16 @@
 </ct:contentTypeSchema>
 </file>
 
-<file path=customXml/item2.xml><?xml version="1.0" encoding="utf-8"?>
-<?mso-contentType ?>
-<FormTemplates xmlns="http://schemas.microsoft.com/sharepoint/v3/contenttype/forms">
-  <Display>DocumentLibraryForm</Display>
-  <Edit>DocumentLibraryForm</Edit>
-  <New>DocumentLibraryForm</New>
-</FormTemplates>
-</file>
-
-<file path=customXml/item3.xml><?xml version="1.0" encoding="utf-8"?>
-<p:properties xmlns:p="http://schemas.microsoft.com/office/2006/metadata/properties" xmlns:xsi="http://www.w3.org/2001/XMLSchema-instance" xmlns:pc="http://schemas.microsoft.com/office/infopath/2007/PartnerControls">
-  <documentManagement/>
-</p:properties>
-</file>
-
 <file path=customXml/itemProps1.xml><?xml version="1.0" encoding="utf-8"?>
-<ds:datastoreItem xmlns:ds="http://schemas.openxmlformats.org/officeDocument/2006/customXml" ds:itemID="{E6473F11-255D-4B38-87ED-63EB159BEF21}">
+<ds:datastoreItem xmlns:ds="http://schemas.openxmlformats.org/officeDocument/2006/customXml" ds:itemID="{82A80D48-2377-4F80-9511-B718F6BDB429}">
   <ds:schemaRefs>
-    <ds:schemaRef ds:uri="http://schemas.microsoft.com/office/2006/metadata/contentType"/>
-    <ds:schemaRef ds:uri="http://schemas.microsoft.com/office/2006/metadata/properties/metaAttributes"/>
-    <ds:schemaRef ds:uri="http://www.w3.org/2001/XMLSchema"/>
     <ds:schemaRef ds:uri="http://schemas.microsoft.com/office/2006/metadata/properties"/>
     <ds:schemaRef ds:uri="http://schemas.openxmlformats.org/package/2006/metadata/core-properties"/>
+    <ds:schemaRef ds:uri="http://purl.org/dc/terms/"/>
     <ds:schemaRef ds:uri="http://purl.org/dc/elements/1.1/"/>
-    <ds:schemaRef ds:uri="http://purl.org/dc/terms/"/>
-    <ds:schemaRef ds:uri="http://schemas.microsoft.com/internal/obd"/>
+    <ds:schemaRef ds:uri="http://purl.org/dc/dcmitype/"/>
+    <ds:schemaRef ds:uri="http://schemas.microsoft.com/office/2006/documentManagement/types"/>
+    <ds:schemaRef ds:uri="http://www.w3.org/XML/1998/namespace"/>
     <ds:schemaRef ds:uri="http://schemas.microsoft.com/office/infopath/2007/PartnerControls"/>
   </ds:schemaRefs>
 </ds:datastoreItem>
@@ -20557,15 +22040,16 @@
 </file>
 
 <file path=customXml/itemProps3.xml><?xml version="1.0" encoding="utf-8"?>
-<ds:datastoreItem xmlns:ds="http://schemas.openxmlformats.org/officeDocument/2006/customXml" ds:itemID="{82A80D48-2377-4F80-9511-B718F6BDB429}">
+<ds:datastoreItem xmlns:ds="http://schemas.openxmlformats.org/officeDocument/2006/customXml" ds:itemID="{E6473F11-255D-4B38-87ED-63EB159BEF21}">
   <ds:schemaRefs>
+    <ds:schemaRef ds:uri="http://schemas.microsoft.com/office/2006/metadata/contentType"/>
+    <ds:schemaRef ds:uri="http://schemas.microsoft.com/office/2006/metadata/properties/metaAttributes"/>
+    <ds:schemaRef ds:uri="http://www.w3.org/2001/XMLSchema"/>
     <ds:schemaRef ds:uri="http://schemas.microsoft.com/office/2006/metadata/properties"/>
     <ds:schemaRef ds:uri="http://schemas.openxmlformats.org/package/2006/metadata/core-properties"/>
+    <ds:schemaRef ds:uri="http://purl.org/dc/elements/1.1/"/>
     <ds:schemaRef ds:uri="http://purl.org/dc/terms/"/>
-    <ds:schemaRef ds:uri="http://purl.org/dc/elements/1.1/"/>
-    <ds:schemaRef ds:uri="http://purl.org/dc/dcmitype/"/>
-    <ds:schemaRef ds:uri="http://schemas.microsoft.com/office/2006/documentManagement/types"/>
-    <ds:schemaRef ds:uri="http://www.w3.org/XML/1998/namespace"/>
+    <ds:schemaRef ds:uri="http://schemas.microsoft.com/internal/obd"/>
     <ds:schemaRef ds:uri="http://schemas.microsoft.com/office/infopath/2007/PartnerControls"/>
   </ds:schemaRefs>
 </ds:datastoreItem>

</xml_diff>

<commit_message>
update with april results
</commit_message>
<xml_diff>
--- a/GASP_Gergely-Attila-Kiss.pptx
+++ b/GASP_Gergely-Attila-Kiss.pptx
@@ -211,7 +211,7 @@
           <a:p>
             <a:fld id="{BA7E31CA-E8B0-4674-B0EE-198DC710A8FA}" type="datetimeFigureOut">
               <a:rPr lang="hu-HU" smtClean="0"/>
-              <a:t>2023.05.30.</a:t>
+              <a:t>2023.06.06.</a:t>
             </a:fld>
             <a:endParaRPr lang="hu-HU"/>
           </a:p>
@@ -705,7 +705,7 @@
           <a:p>
             <a:fld id="{37212EF4-3C67-4A44-B776-E3B0EAE400F2}" type="datetime1">
               <a:rPr lang="hu-HU" smtClean="0"/>
-              <a:t>2023.05.30.</a:t>
+              <a:t>2023.06.06.</a:t>
             </a:fld>
             <a:endParaRPr lang="hu-HU"/>
           </a:p>
@@ -887,7 +887,7 @@
           <a:p>
             <a:fld id="{07D25B75-A4E4-49B5-8D88-0B32B5B23B28}" type="datetime1">
               <a:rPr lang="hu-HU" smtClean="0"/>
-              <a:t>2023.05.30.</a:t>
+              <a:t>2023.06.06.</a:t>
             </a:fld>
             <a:endParaRPr lang="hu-HU"/>
           </a:p>
@@ -1079,7 +1079,7 @@
           <a:p>
             <a:fld id="{19E28890-4830-4AAC-9779-52F9A03917DA}" type="datetime1">
               <a:rPr lang="hu-HU" smtClean="0"/>
-              <a:t>2023.05.30.</a:t>
+              <a:t>2023.06.06.</a:t>
             </a:fld>
             <a:endParaRPr lang="hu-HU"/>
           </a:p>
@@ -1261,7 +1261,7 @@
           <a:p>
             <a:fld id="{72724B01-37D9-487D-992A-9F1E6573304E}" type="datetime1">
               <a:rPr lang="hu-HU" smtClean="0"/>
-              <a:t>2023.05.30.</a:t>
+              <a:t>2023.06.06.</a:t>
             </a:fld>
             <a:endParaRPr lang="hu-HU"/>
           </a:p>
@@ -1520,7 +1520,7 @@
           <a:p>
             <a:fld id="{97C72D8D-B3C0-49FA-91B8-97B98E1DA79F}" type="datetime1">
               <a:rPr lang="hu-HU" smtClean="0"/>
-              <a:t>2023.05.30.</a:t>
+              <a:t>2023.06.06.</a:t>
             </a:fld>
             <a:endParaRPr lang="hu-HU"/>
           </a:p>
@@ -1763,7 +1763,7 @@
           <a:p>
             <a:fld id="{02F6EBB3-63C9-41DC-88C5-CCAAD0621F66}" type="datetime1">
               <a:rPr lang="hu-HU" smtClean="0"/>
-              <a:t>2023.05.30.</a:t>
+              <a:t>2023.06.06.</a:t>
             </a:fld>
             <a:endParaRPr lang="hu-HU"/>
           </a:p>
@@ -2141,7 +2141,7 @@
           <a:p>
             <a:fld id="{F12FB369-5EEC-4926-ACCD-B1D9BFF89D01}" type="datetime1">
               <a:rPr lang="hu-HU" smtClean="0"/>
-              <a:t>2023.05.30.</a:t>
+              <a:t>2023.06.06.</a:t>
             </a:fld>
             <a:endParaRPr lang="hu-HU"/>
           </a:p>
@@ -2272,7 +2272,7 @@
           <a:p>
             <a:fld id="{195B96B3-106F-4F54-87CA-E6DD2D3D60CD}" type="datetime1">
               <a:rPr lang="hu-HU" smtClean="0"/>
-              <a:t>2023.05.30.</a:t>
+              <a:t>2023.06.06.</a:t>
             </a:fld>
             <a:endParaRPr lang="hu-HU"/>
           </a:p>
@@ -2381,7 +2381,7 @@
           <a:p>
             <a:fld id="{48A18E0D-C935-48B8-8F24-4EF377896796}" type="datetime1">
               <a:rPr lang="hu-HU" smtClean="0"/>
-              <a:t>2023.05.30.</a:t>
+              <a:t>2023.06.06.</a:t>
             </a:fld>
             <a:endParaRPr lang="hu-HU"/>
           </a:p>
@@ -2670,7 +2670,7 @@
           <a:p>
             <a:fld id="{D518D791-B04B-4F68-B09A-41A2B7D37E06}" type="datetime1">
               <a:rPr lang="hu-HU" smtClean="0"/>
-              <a:t>2023.05.30.</a:t>
+              <a:t>2023.06.06.</a:t>
             </a:fld>
             <a:endParaRPr lang="hu-HU"/>
           </a:p>
@@ -2936,7 +2936,7 @@
           <a:p>
             <a:fld id="{378FA7CC-00C7-478E-9186-2EACB97136E9}" type="datetime1">
               <a:rPr lang="hu-HU" smtClean="0"/>
-              <a:t>2023.05.30.</a:t>
+              <a:t>2023.06.06.</a:t>
             </a:fld>
             <a:endParaRPr lang="hu-HU"/>
           </a:p>
@@ -3156,7 +3156,7 @@
           <a:p>
             <a:fld id="{ECD1B67F-EF5F-4105-86D3-4679951838A5}" type="datetime1">
               <a:rPr lang="hu-HU" smtClean="0"/>
-              <a:t>2023.05.30.</a:t>
+              <a:t>2023.06.06.</a:t>
             </a:fld>
             <a:endParaRPr lang="hu-HU"/>
           </a:p>
@@ -10089,15 +10089,15 @@
       </p:sp>
       <p:pic>
         <p:nvPicPr>
-          <p:cNvPr id="7" name="Kép 6">
+          <p:cNvPr id="10" name="Kép 9">
             <a:extLst>
               <a:ext uri="{FF2B5EF4-FFF2-40B4-BE49-F238E27FC236}">
-                <a16:creationId xmlns:a16="http://schemas.microsoft.com/office/drawing/2014/main" id="{0EE811EB-EE5B-4470-966F-044276A99995}"/>
+                <a16:creationId xmlns:a16="http://schemas.microsoft.com/office/drawing/2014/main" id="{11FB38B1-1430-45D6-B463-BCE25D90D9CB}"/>
               </a:ext>
             </a:extLst>
           </p:cNvPr>
           <p:cNvPicPr>
-            <a:picLocks noChangeAspect="1"/>
+            <a:picLocks/>
           </p:cNvPicPr>
           <p:nvPr/>
         </p:nvPicPr>
@@ -10115,8 +10115,8 @@
         </p:blipFill>
         <p:spPr>
           <a:xfrm>
-            <a:off x="6673800" y="1245367"/>
-            <a:ext cx="4680000" cy="2449187"/>
+            <a:off x="6673800" y="1343368"/>
+            <a:ext cx="4680000" cy="2520000"/>
           </a:xfrm>
           <a:prstGeom prst="rect">
             <a:avLst/>
@@ -10125,10 +10125,10 @@
       </p:pic>
       <p:pic>
         <p:nvPicPr>
-          <p:cNvPr id="6" name="Kép 5">
+          <p:cNvPr id="12" name="Kép 11">
             <a:extLst>
               <a:ext uri="{FF2B5EF4-FFF2-40B4-BE49-F238E27FC236}">
-                <a16:creationId xmlns:a16="http://schemas.microsoft.com/office/drawing/2014/main" id="{CE67A5DB-3870-4F59-8F43-604C36AB3825}"/>
+                <a16:creationId xmlns:a16="http://schemas.microsoft.com/office/drawing/2014/main" id="{F4DE65CC-5C70-4922-BD89-DF8E88FBA666}"/>
               </a:ext>
             </a:extLst>
           </p:cNvPr>
@@ -10151,7 +10151,7 @@
         </p:blipFill>
         <p:spPr>
           <a:xfrm>
-            <a:off x="6673800" y="3694554"/>
+            <a:off x="6673800" y="3712472"/>
             <a:ext cx="4680000" cy="2520000"/>
           </a:xfrm>
           <a:prstGeom prst="rect">
@@ -10939,23 +10939,8 @@
                 </a:solidFill>
                 <a:latin typeface="Myriad "/>
               </a:rPr>
-              <a:t> 2, 4, 2, 4, 4 and </a:t>
-            </a:r>
-            <a:r>
-              <a:rPr lang="hu-HU" sz="1800" dirty="0" err="1">
-                <a:solidFill>
-                  <a:srgbClr val="002060"/>
-                </a:solidFill>
-                <a:latin typeface="Myriad "/>
-              </a:rPr>
-              <a:t>x.</a:t>
-            </a:r>
-            <a:endParaRPr lang="hu-HU" sz="1800" dirty="0">
-              <a:solidFill>
-                <a:srgbClr val="002060"/>
-              </a:solidFill>
-              <a:latin typeface="Myriad "/>
-            </a:endParaRPr>
+              <a:t> 2, 4, 2, 4, 4 and 6.</a:t>
+            </a:r>
           </a:p>
           <a:p>
             <a:pPr algn="just"/>
@@ -11242,7 +11227,7 @@
               <a:t>Also</a:t>
             </a:r>
             <a:r>
-              <a:rPr lang="hu-HU" sz="1400">
+              <a:rPr lang="hu-HU" sz="1400" dirty="0">
                 <a:solidFill>
                   <a:srgbClr val="002060"/>
                 </a:solidFill>
@@ -21888,21 +21873,6 @@
 </file>
 
 <file path=customXml/item1.xml><?xml version="1.0" encoding="utf-8"?>
-<p:properties xmlns:p="http://schemas.microsoft.com/office/2006/metadata/properties" xmlns:xsi="http://www.w3.org/2001/XMLSchema-instance" xmlns:pc="http://schemas.microsoft.com/office/infopath/2007/PartnerControls">
-  <documentManagement/>
-</p:properties>
-</file>
-
-<file path=customXml/item2.xml><?xml version="1.0" encoding="utf-8"?>
-<?mso-contentType ?>
-<FormTemplates xmlns="http://schemas.microsoft.com/sharepoint/v3/contenttype/forms">
-  <Display>DocumentLibraryForm</Display>
-  <Edit>DocumentLibraryForm</Edit>
-  <New>DocumentLibraryForm</New>
-</FormTemplates>
-</file>
-
-<file path=customXml/item3.xml><?xml version="1.0" encoding="utf-8"?>
 <ct:contentTypeSchema xmlns:ct="http://schemas.microsoft.com/office/2006/metadata/contentType" xmlns:ma="http://schemas.microsoft.com/office/2006/metadata/properties/metaAttributes" ct:_="" ma:_="" ma:contentTypeName="Dokumentum" ma:contentTypeID="0x0101000FDB48AD5866D645BB0EE4F460BF82F1" ma:contentTypeVersion="0" ma:contentTypeDescription="Új dokumentum létrehozása." ma:contentTypeScope="" ma:versionID="c2905b2c3e1aa4985b7e2496453a0314">
   <xsd:schema xmlns:xsd="http://www.w3.org/2001/XMLSchema" xmlns:xs="http://www.w3.org/2001/XMLSchema" xmlns:p="http://schemas.microsoft.com/office/2006/metadata/properties" targetNamespace="http://schemas.microsoft.com/office/2006/metadata/properties" ma:root="true" ma:fieldsID="08dee037046ad32af3116d3be75d37a6">
     <xsd:element name="properties">
@@ -22016,16 +21986,32 @@
 </ct:contentTypeSchema>
 </file>
 
+<file path=customXml/item2.xml><?xml version="1.0" encoding="utf-8"?>
+<?mso-contentType ?>
+<FormTemplates xmlns="http://schemas.microsoft.com/sharepoint/v3/contenttype/forms">
+  <Display>DocumentLibraryForm</Display>
+  <Edit>DocumentLibraryForm</Edit>
+  <New>DocumentLibraryForm</New>
+</FormTemplates>
+</file>
+
+<file path=customXml/item3.xml><?xml version="1.0" encoding="utf-8"?>
+<p:properties xmlns:p="http://schemas.microsoft.com/office/2006/metadata/properties" xmlns:xsi="http://www.w3.org/2001/XMLSchema-instance" xmlns:pc="http://schemas.microsoft.com/office/infopath/2007/PartnerControls">
+  <documentManagement/>
+</p:properties>
+</file>
+
 <file path=customXml/itemProps1.xml><?xml version="1.0" encoding="utf-8"?>
-<ds:datastoreItem xmlns:ds="http://schemas.openxmlformats.org/officeDocument/2006/customXml" ds:itemID="{82A80D48-2377-4F80-9511-B718F6BDB429}">
+<ds:datastoreItem xmlns:ds="http://schemas.openxmlformats.org/officeDocument/2006/customXml" ds:itemID="{E6473F11-255D-4B38-87ED-63EB159BEF21}">
   <ds:schemaRefs>
+    <ds:schemaRef ds:uri="http://schemas.microsoft.com/office/2006/metadata/contentType"/>
+    <ds:schemaRef ds:uri="http://schemas.microsoft.com/office/2006/metadata/properties/metaAttributes"/>
+    <ds:schemaRef ds:uri="http://www.w3.org/2001/XMLSchema"/>
     <ds:schemaRef ds:uri="http://schemas.microsoft.com/office/2006/metadata/properties"/>
     <ds:schemaRef ds:uri="http://schemas.openxmlformats.org/package/2006/metadata/core-properties"/>
+    <ds:schemaRef ds:uri="http://purl.org/dc/elements/1.1/"/>
     <ds:schemaRef ds:uri="http://purl.org/dc/terms/"/>
-    <ds:schemaRef ds:uri="http://purl.org/dc/elements/1.1/"/>
-    <ds:schemaRef ds:uri="http://purl.org/dc/dcmitype/"/>
-    <ds:schemaRef ds:uri="http://schemas.microsoft.com/office/2006/documentManagement/types"/>
-    <ds:schemaRef ds:uri="http://www.w3.org/XML/1998/namespace"/>
+    <ds:schemaRef ds:uri="http://schemas.microsoft.com/internal/obd"/>
     <ds:schemaRef ds:uri="http://schemas.microsoft.com/office/infopath/2007/PartnerControls"/>
   </ds:schemaRefs>
 </ds:datastoreItem>
@@ -22040,16 +22026,15 @@
 </file>
 
 <file path=customXml/itemProps3.xml><?xml version="1.0" encoding="utf-8"?>
-<ds:datastoreItem xmlns:ds="http://schemas.openxmlformats.org/officeDocument/2006/customXml" ds:itemID="{E6473F11-255D-4B38-87ED-63EB159BEF21}">
+<ds:datastoreItem xmlns:ds="http://schemas.openxmlformats.org/officeDocument/2006/customXml" ds:itemID="{82A80D48-2377-4F80-9511-B718F6BDB429}">
   <ds:schemaRefs>
-    <ds:schemaRef ds:uri="http://schemas.microsoft.com/office/2006/metadata/contentType"/>
-    <ds:schemaRef ds:uri="http://schemas.microsoft.com/office/2006/metadata/properties/metaAttributes"/>
-    <ds:schemaRef ds:uri="http://www.w3.org/2001/XMLSchema"/>
     <ds:schemaRef ds:uri="http://schemas.microsoft.com/office/2006/metadata/properties"/>
     <ds:schemaRef ds:uri="http://schemas.openxmlformats.org/package/2006/metadata/core-properties"/>
+    <ds:schemaRef ds:uri="http://purl.org/dc/terms/"/>
     <ds:schemaRef ds:uri="http://purl.org/dc/elements/1.1/"/>
-    <ds:schemaRef ds:uri="http://purl.org/dc/terms/"/>
-    <ds:schemaRef ds:uri="http://schemas.microsoft.com/internal/obd"/>
+    <ds:schemaRef ds:uri="http://purl.org/dc/dcmitype/"/>
+    <ds:schemaRef ds:uri="http://schemas.microsoft.com/office/2006/documentManagement/types"/>
+    <ds:schemaRef ds:uri="http://www.w3.org/XML/1998/namespace"/>
     <ds:schemaRef ds:uri="http://schemas.microsoft.com/office/infopath/2007/PartnerControls"/>
   </ds:schemaRefs>
 </ds:datastoreItem>

</xml_diff>